<commit_message>
Slightly beautified ML Workflow Model. Inclusion of external Data. No real content changes. Please check whether arrows make sense in data pipeline.
</commit_message>
<xml_diff>
--- a/ML Workflow Model.pptx
+++ b/ML Workflow Model.pptx
@@ -2,12 +2,12 @@
 <file path=ppt/presentation.xml><?xml version="1.0" encoding="utf-8"?>
 <p:presentation xmlns:a="http://schemas.openxmlformats.org/drawingml/2006/main" xmlns:r="http://schemas.openxmlformats.org/officeDocument/2006/relationships" xmlns:p="http://schemas.openxmlformats.org/presentationml/2006/main" saveSubsetFonts="1" autoCompressPictures="0">
   <p:sldMasterIdLst>
-    <p:sldMasterId id="2147483708" r:id="rId1"/>
+    <p:sldMasterId id="2147483732" r:id="rId1"/>
   </p:sldMasterIdLst>
   <p:sldIdLst>
-    <p:sldId id="258" r:id="rId2"/>
+    <p:sldId id="259" r:id="rId2"/>
   </p:sldIdLst>
-  <p:sldSz cx="25199975" cy="14400213"/>
+  <p:sldSz cx="21599525" cy="13320713"/>
   <p:notesSz cx="6858000" cy="9144000"/>
   <p:defaultTextStyle>
     <a:defPPr>
@@ -107,12 +107,12 @@
   <p:extLst>
     <p:ext uri="{EFAFB233-063F-42B5-8137-9DF3F51BA10A}">
       <p15:sldGuideLst xmlns:p15="http://schemas.microsoft.com/office/powerpoint/2012/main">
-        <p15:guide id="1" orient="horz" pos="4536" userDrawn="1">
+        <p15:guide id="1" orient="horz" pos="4196" userDrawn="1">
           <p15:clr>
             <a:srgbClr val="A4A3A4"/>
           </p15:clr>
         </p15:guide>
-        <p15:guide id="2" pos="8000" userDrawn="1">
+        <p15:guide id="2" pos="6857" userDrawn="1">
           <p15:clr>
             <a:srgbClr val="A4A3A4"/>
           </p15:clr>
@@ -158,15 +158,15 @@
         </p:nvSpPr>
         <p:spPr>
           <a:xfrm>
-            <a:off x="3149997" y="2356703"/>
-            <a:ext cx="18899981" cy="5013407"/>
+            <a:off x="2699941" y="2180034"/>
+            <a:ext cx="16199644" cy="4637582"/>
           </a:xfrm>
         </p:spPr>
         <p:txBody>
           <a:bodyPr anchor="b"/>
           <a:lstStyle>
             <a:lvl1pPr algn="ctr">
-              <a:defRPr sz="12401"/>
+              <a:defRPr sz="10630"/>
             </a:lvl1pPr>
           </a:lstStyle>
           <a:p>
@@ -189,8 +189,8 @@
         </p:nvSpPr>
         <p:spPr>
           <a:xfrm>
-            <a:off x="3149997" y="7563446"/>
-            <a:ext cx="18899981" cy="3476717"/>
+            <a:off x="2699941" y="6996459"/>
+            <a:ext cx="16199644" cy="3216088"/>
           </a:xfrm>
         </p:spPr>
         <p:txBody>
@@ -198,39 +198,39 @@
           <a:lstStyle>
             <a:lvl1pPr marL="0" indent="0" algn="ctr">
               <a:buNone/>
-              <a:defRPr sz="4961"/>
+              <a:defRPr sz="4252"/>
             </a:lvl1pPr>
-            <a:lvl2pPr marL="944987" indent="0" algn="ctr">
-              <a:buNone/>
-              <a:defRPr sz="4134"/>
+            <a:lvl2pPr marL="809976" indent="0" algn="ctr">
+              <a:buNone/>
+              <a:defRPr sz="3543"/>
             </a:lvl2pPr>
-            <a:lvl3pPr marL="1889973" indent="0" algn="ctr">
-              <a:buNone/>
-              <a:defRPr sz="3720"/>
+            <a:lvl3pPr marL="1619951" indent="0" algn="ctr">
+              <a:buNone/>
+              <a:defRPr sz="3189"/>
             </a:lvl3pPr>
-            <a:lvl4pPr marL="2834960" indent="0" algn="ctr">
-              <a:buNone/>
-              <a:defRPr sz="3307"/>
+            <a:lvl4pPr marL="2429927" indent="0" algn="ctr">
+              <a:buNone/>
+              <a:defRPr sz="2835"/>
             </a:lvl4pPr>
-            <a:lvl5pPr marL="3779947" indent="0" algn="ctr">
-              <a:buNone/>
-              <a:defRPr sz="3307"/>
+            <a:lvl5pPr marL="3239902" indent="0" algn="ctr">
+              <a:buNone/>
+              <a:defRPr sz="2835"/>
             </a:lvl5pPr>
-            <a:lvl6pPr marL="4724933" indent="0" algn="ctr">
-              <a:buNone/>
-              <a:defRPr sz="3307"/>
+            <a:lvl6pPr marL="4049878" indent="0" algn="ctr">
+              <a:buNone/>
+              <a:defRPr sz="2835"/>
             </a:lvl6pPr>
-            <a:lvl7pPr marL="5669920" indent="0" algn="ctr">
-              <a:buNone/>
-              <a:defRPr sz="3307"/>
+            <a:lvl7pPr marL="4859853" indent="0" algn="ctr">
+              <a:buNone/>
+              <a:defRPr sz="2835"/>
             </a:lvl7pPr>
-            <a:lvl8pPr marL="6614907" indent="0" algn="ctr">
-              <a:buNone/>
-              <a:defRPr sz="3307"/>
+            <a:lvl8pPr marL="5669829" indent="0" algn="ctr">
+              <a:buNone/>
+              <a:defRPr sz="2835"/>
             </a:lvl8pPr>
-            <a:lvl9pPr marL="7559893" indent="0" algn="ctr">
-              <a:buNone/>
-              <a:defRPr sz="3307"/>
+            <a:lvl9pPr marL="6479804" indent="0" algn="ctr">
+              <a:buNone/>
+              <a:defRPr sz="2835"/>
             </a:lvl9pPr>
           </a:lstStyle>
           <a:p>
@@ -307,7 +307,7 @@
     </p:spTree>
     <p:extLst>
       <p:ext uri="{BB962C8B-B14F-4D97-AF65-F5344CB8AC3E}">
-        <p14:creationId xmlns:p14="http://schemas.microsoft.com/office/powerpoint/2010/main" val="1141933077"/>
+        <p14:creationId xmlns:p14="http://schemas.microsoft.com/office/powerpoint/2010/main" val="3016929331"/>
       </p:ext>
     </p:extLst>
   </p:cSld>
@@ -473,7 +473,7 @@
     </p:spTree>
     <p:extLst>
       <p:ext uri="{BB962C8B-B14F-4D97-AF65-F5344CB8AC3E}">
-        <p14:creationId xmlns:p14="http://schemas.microsoft.com/office/powerpoint/2010/main" val="190453813"/>
+        <p14:creationId xmlns:p14="http://schemas.microsoft.com/office/powerpoint/2010/main" val="1189766786"/>
       </p:ext>
     </p:extLst>
   </p:cSld>
@@ -512,8 +512,8 @@
         </p:nvSpPr>
         <p:spPr>
           <a:xfrm>
-            <a:off x="18033732" y="766678"/>
-            <a:ext cx="5433745" cy="12203515"/>
+            <a:off x="15457160" y="709204"/>
+            <a:ext cx="4657398" cy="11288689"/>
           </a:xfrm>
         </p:spPr>
         <p:txBody>
@@ -539,8 +539,8 @@
         </p:nvSpPr>
         <p:spPr>
           <a:xfrm>
-            <a:off x="1732498" y="766678"/>
-            <a:ext cx="15986234" cy="12203515"/>
+            <a:off x="1484967" y="709204"/>
+            <a:ext cx="13702199" cy="11288689"/>
           </a:xfrm>
         </p:spPr>
         <p:txBody>
@@ -649,7 +649,7 @@
     </p:spTree>
     <p:extLst>
       <p:ext uri="{BB962C8B-B14F-4D97-AF65-F5344CB8AC3E}">
-        <p14:creationId xmlns:p14="http://schemas.microsoft.com/office/powerpoint/2010/main" val="1638725298"/>
+        <p14:creationId xmlns:p14="http://schemas.microsoft.com/office/powerpoint/2010/main" val="2857442229"/>
       </p:ext>
     </p:extLst>
   </p:cSld>
@@ -815,7 +815,7 @@
     </p:spTree>
     <p:extLst>
       <p:ext uri="{BB962C8B-B14F-4D97-AF65-F5344CB8AC3E}">
-        <p14:creationId xmlns:p14="http://schemas.microsoft.com/office/powerpoint/2010/main" val="3195141640"/>
+        <p14:creationId xmlns:p14="http://schemas.microsoft.com/office/powerpoint/2010/main" val="104858199"/>
       </p:ext>
     </p:extLst>
   </p:cSld>
@@ -854,15 +854,15 @@
         </p:nvSpPr>
         <p:spPr>
           <a:xfrm>
-            <a:off x="1719374" y="3590055"/>
-            <a:ext cx="21734978" cy="5990088"/>
+            <a:off x="1473718" y="3320930"/>
+            <a:ext cx="18629590" cy="5541046"/>
           </a:xfrm>
         </p:spPr>
         <p:txBody>
           <a:bodyPr anchor="b"/>
           <a:lstStyle>
             <a:lvl1pPr>
-              <a:defRPr sz="12401"/>
+              <a:defRPr sz="10630"/>
             </a:lvl1pPr>
           </a:lstStyle>
           <a:p>
@@ -885,8 +885,8 @@
         </p:nvSpPr>
         <p:spPr>
           <a:xfrm>
-            <a:off x="1719374" y="9636811"/>
-            <a:ext cx="21734978" cy="3150046"/>
+            <a:off x="1473718" y="8914396"/>
+            <a:ext cx="18629590" cy="2913905"/>
           </a:xfrm>
         </p:spPr>
         <p:txBody>
@@ -894,7 +894,7 @@
           <a:lstStyle>
             <a:lvl1pPr marL="0" indent="0">
               <a:buNone/>
-              <a:defRPr sz="4961">
+              <a:defRPr sz="4252">
                 <a:solidFill>
                   <a:schemeClr val="tx1">
                     <a:tint val="75000"/>
@@ -902,9 +902,9 @@
                 </a:solidFill>
               </a:defRPr>
             </a:lvl1pPr>
-            <a:lvl2pPr marL="944987" indent="0">
-              <a:buNone/>
-              <a:defRPr sz="4134">
+            <a:lvl2pPr marL="809976" indent="0">
+              <a:buNone/>
+              <a:defRPr sz="3543">
                 <a:solidFill>
                   <a:schemeClr val="tx1">
                     <a:tint val="75000"/>
@@ -912,9 +912,9 @@
                 </a:solidFill>
               </a:defRPr>
             </a:lvl2pPr>
-            <a:lvl3pPr marL="1889973" indent="0">
-              <a:buNone/>
-              <a:defRPr sz="3720">
+            <a:lvl3pPr marL="1619951" indent="0">
+              <a:buNone/>
+              <a:defRPr sz="3189">
                 <a:solidFill>
                   <a:schemeClr val="tx1">
                     <a:tint val="75000"/>
@@ -922,9 +922,9 @@
                 </a:solidFill>
               </a:defRPr>
             </a:lvl3pPr>
-            <a:lvl4pPr marL="2834960" indent="0">
-              <a:buNone/>
-              <a:defRPr sz="3307">
+            <a:lvl4pPr marL="2429927" indent="0">
+              <a:buNone/>
+              <a:defRPr sz="2835">
                 <a:solidFill>
                   <a:schemeClr val="tx1">
                     <a:tint val="75000"/>
@@ -932,9 +932,9 @@
                 </a:solidFill>
               </a:defRPr>
             </a:lvl4pPr>
-            <a:lvl5pPr marL="3779947" indent="0">
-              <a:buNone/>
-              <a:defRPr sz="3307">
+            <a:lvl5pPr marL="3239902" indent="0">
+              <a:buNone/>
+              <a:defRPr sz="2835">
                 <a:solidFill>
                   <a:schemeClr val="tx1">
                     <a:tint val="75000"/>
@@ -942,9 +942,9 @@
                 </a:solidFill>
               </a:defRPr>
             </a:lvl5pPr>
-            <a:lvl6pPr marL="4724933" indent="0">
-              <a:buNone/>
-              <a:defRPr sz="3307">
+            <a:lvl6pPr marL="4049878" indent="0">
+              <a:buNone/>
+              <a:defRPr sz="2835">
                 <a:solidFill>
                   <a:schemeClr val="tx1">
                     <a:tint val="75000"/>
@@ -952,9 +952,9 @@
                 </a:solidFill>
               </a:defRPr>
             </a:lvl6pPr>
-            <a:lvl7pPr marL="5669920" indent="0">
-              <a:buNone/>
-              <a:defRPr sz="3307">
+            <a:lvl7pPr marL="4859853" indent="0">
+              <a:buNone/>
+              <a:defRPr sz="2835">
                 <a:solidFill>
                   <a:schemeClr val="tx1">
                     <a:tint val="75000"/>
@@ -962,9 +962,9 @@
                 </a:solidFill>
               </a:defRPr>
             </a:lvl7pPr>
-            <a:lvl8pPr marL="6614907" indent="0">
-              <a:buNone/>
-              <a:defRPr sz="3307">
+            <a:lvl8pPr marL="5669829" indent="0">
+              <a:buNone/>
+              <a:defRPr sz="2835">
                 <a:solidFill>
                   <a:schemeClr val="tx1">
                     <a:tint val="75000"/>
@@ -972,9 +972,9 @@
                 </a:solidFill>
               </a:defRPr>
             </a:lvl8pPr>
-            <a:lvl9pPr marL="7559893" indent="0">
-              <a:buNone/>
-              <a:defRPr sz="3307">
+            <a:lvl9pPr marL="6479804" indent="0">
+              <a:buNone/>
+              <a:defRPr sz="2835">
                 <a:solidFill>
                   <a:schemeClr val="tx1">
                     <a:tint val="75000"/>
@@ -1058,7 +1058,7 @@
     </p:spTree>
     <p:extLst>
       <p:ext uri="{BB962C8B-B14F-4D97-AF65-F5344CB8AC3E}">
-        <p14:creationId xmlns:p14="http://schemas.microsoft.com/office/powerpoint/2010/main" val="1078374403"/>
+        <p14:creationId xmlns:p14="http://schemas.microsoft.com/office/powerpoint/2010/main" val="806415807"/>
       </p:ext>
     </p:extLst>
   </p:cSld>
@@ -1119,8 +1119,8 @@
         </p:nvSpPr>
         <p:spPr>
           <a:xfrm>
-            <a:off x="1732498" y="3833390"/>
-            <a:ext cx="10709989" cy="9136803"/>
+            <a:off x="1484967" y="3546023"/>
+            <a:ext cx="9179798" cy="8451870"/>
           </a:xfrm>
         </p:spPr>
         <p:txBody>
@@ -1175,8 +1175,8 @@
         </p:nvSpPr>
         <p:spPr>
           <a:xfrm>
-            <a:off x="12757488" y="3833390"/>
-            <a:ext cx="10709989" cy="9136803"/>
+            <a:off x="10934760" y="3546023"/>
+            <a:ext cx="9179798" cy="8451870"/>
           </a:xfrm>
         </p:spPr>
         <p:txBody>
@@ -1285,7 +1285,7 @@
     </p:spTree>
     <p:extLst>
       <p:ext uri="{BB962C8B-B14F-4D97-AF65-F5344CB8AC3E}">
-        <p14:creationId xmlns:p14="http://schemas.microsoft.com/office/powerpoint/2010/main" val="1799201496"/>
+        <p14:creationId xmlns:p14="http://schemas.microsoft.com/office/powerpoint/2010/main" val="2196668307"/>
       </p:ext>
     </p:extLst>
   </p:cSld>
@@ -1324,8 +1324,8 @@
         </p:nvSpPr>
         <p:spPr>
           <a:xfrm>
-            <a:off x="1735781" y="766679"/>
-            <a:ext cx="21734978" cy="2783376"/>
+            <a:off x="1487781" y="709206"/>
+            <a:ext cx="18629590" cy="2574722"/>
           </a:xfrm>
         </p:spPr>
         <p:txBody>
@@ -1351,8 +1351,8 @@
         </p:nvSpPr>
         <p:spPr>
           <a:xfrm>
-            <a:off x="1735781" y="3530053"/>
-            <a:ext cx="10660770" cy="1730025"/>
+            <a:off x="1487781" y="3265426"/>
+            <a:ext cx="9137611" cy="1600335"/>
           </a:xfrm>
         </p:spPr>
         <p:txBody>
@@ -1360,39 +1360,39 @@
           <a:lstStyle>
             <a:lvl1pPr marL="0" indent="0">
               <a:buNone/>
-              <a:defRPr sz="4961" b="1"/>
+              <a:defRPr sz="4252" b="1"/>
             </a:lvl1pPr>
-            <a:lvl2pPr marL="944987" indent="0">
-              <a:buNone/>
-              <a:defRPr sz="4134" b="1"/>
+            <a:lvl2pPr marL="809976" indent="0">
+              <a:buNone/>
+              <a:defRPr sz="3543" b="1"/>
             </a:lvl2pPr>
-            <a:lvl3pPr marL="1889973" indent="0">
-              <a:buNone/>
-              <a:defRPr sz="3720" b="1"/>
+            <a:lvl3pPr marL="1619951" indent="0">
+              <a:buNone/>
+              <a:defRPr sz="3189" b="1"/>
             </a:lvl3pPr>
-            <a:lvl4pPr marL="2834960" indent="0">
-              <a:buNone/>
-              <a:defRPr sz="3307" b="1"/>
+            <a:lvl4pPr marL="2429927" indent="0">
+              <a:buNone/>
+              <a:defRPr sz="2835" b="1"/>
             </a:lvl4pPr>
-            <a:lvl5pPr marL="3779947" indent="0">
-              <a:buNone/>
-              <a:defRPr sz="3307" b="1"/>
+            <a:lvl5pPr marL="3239902" indent="0">
+              <a:buNone/>
+              <a:defRPr sz="2835" b="1"/>
             </a:lvl5pPr>
-            <a:lvl6pPr marL="4724933" indent="0">
-              <a:buNone/>
-              <a:defRPr sz="3307" b="1"/>
+            <a:lvl6pPr marL="4049878" indent="0">
+              <a:buNone/>
+              <a:defRPr sz="2835" b="1"/>
             </a:lvl6pPr>
-            <a:lvl7pPr marL="5669920" indent="0">
-              <a:buNone/>
-              <a:defRPr sz="3307" b="1"/>
+            <a:lvl7pPr marL="4859853" indent="0">
+              <a:buNone/>
+              <a:defRPr sz="2835" b="1"/>
             </a:lvl7pPr>
-            <a:lvl8pPr marL="6614907" indent="0">
-              <a:buNone/>
-              <a:defRPr sz="3307" b="1"/>
+            <a:lvl8pPr marL="5669829" indent="0">
+              <a:buNone/>
+              <a:defRPr sz="2835" b="1"/>
             </a:lvl8pPr>
-            <a:lvl9pPr marL="7559893" indent="0">
-              <a:buNone/>
-              <a:defRPr sz="3307" b="1"/>
+            <a:lvl9pPr marL="6479804" indent="0">
+              <a:buNone/>
+              <a:defRPr sz="2835" b="1"/>
             </a:lvl9pPr>
           </a:lstStyle>
           <a:p>
@@ -1416,8 +1416,8 @@
         </p:nvSpPr>
         <p:spPr>
           <a:xfrm>
-            <a:off x="1735781" y="5260078"/>
-            <a:ext cx="10660770" cy="7736782"/>
+            <a:off x="1487781" y="4865760"/>
+            <a:ext cx="9137611" cy="7156801"/>
           </a:xfrm>
         </p:spPr>
         <p:txBody>
@@ -1472,8 +1472,8 @@
         </p:nvSpPr>
         <p:spPr>
           <a:xfrm>
-            <a:off x="12757487" y="3530053"/>
-            <a:ext cx="10713272" cy="1730025"/>
+            <a:off x="10934760" y="3265426"/>
+            <a:ext cx="9182611" cy="1600335"/>
           </a:xfrm>
         </p:spPr>
         <p:txBody>
@@ -1481,39 +1481,39 @@
           <a:lstStyle>
             <a:lvl1pPr marL="0" indent="0">
               <a:buNone/>
-              <a:defRPr sz="4961" b="1"/>
+              <a:defRPr sz="4252" b="1"/>
             </a:lvl1pPr>
-            <a:lvl2pPr marL="944987" indent="0">
-              <a:buNone/>
-              <a:defRPr sz="4134" b="1"/>
+            <a:lvl2pPr marL="809976" indent="0">
+              <a:buNone/>
+              <a:defRPr sz="3543" b="1"/>
             </a:lvl2pPr>
-            <a:lvl3pPr marL="1889973" indent="0">
-              <a:buNone/>
-              <a:defRPr sz="3720" b="1"/>
+            <a:lvl3pPr marL="1619951" indent="0">
+              <a:buNone/>
+              <a:defRPr sz="3189" b="1"/>
             </a:lvl3pPr>
-            <a:lvl4pPr marL="2834960" indent="0">
-              <a:buNone/>
-              <a:defRPr sz="3307" b="1"/>
+            <a:lvl4pPr marL="2429927" indent="0">
+              <a:buNone/>
+              <a:defRPr sz="2835" b="1"/>
             </a:lvl4pPr>
-            <a:lvl5pPr marL="3779947" indent="0">
-              <a:buNone/>
-              <a:defRPr sz="3307" b="1"/>
+            <a:lvl5pPr marL="3239902" indent="0">
+              <a:buNone/>
+              <a:defRPr sz="2835" b="1"/>
             </a:lvl5pPr>
-            <a:lvl6pPr marL="4724933" indent="0">
-              <a:buNone/>
-              <a:defRPr sz="3307" b="1"/>
+            <a:lvl6pPr marL="4049878" indent="0">
+              <a:buNone/>
+              <a:defRPr sz="2835" b="1"/>
             </a:lvl6pPr>
-            <a:lvl7pPr marL="5669920" indent="0">
-              <a:buNone/>
-              <a:defRPr sz="3307" b="1"/>
+            <a:lvl7pPr marL="4859853" indent="0">
+              <a:buNone/>
+              <a:defRPr sz="2835" b="1"/>
             </a:lvl7pPr>
-            <a:lvl8pPr marL="6614907" indent="0">
-              <a:buNone/>
-              <a:defRPr sz="3307" b="1"/>
+            <a:lvl8pPr marL="5669829" indent="0">
+              <a:buNone/>
+              <a:defRPr sz="2835" b="1"/>
             </a:lvl8pPr>
-            <a:lvl9pPr marL="7559893" indent="0">
-              <a:buNone/>
-              <a:defRPr sz="3307" b="1"/>
+            <a:lvl9pPr marL="6479804" indent="0">
+              <a:buNone/>
+              <a:defRPr sz="2835" b="1"/>
             </a:lvl9pPr>
           </a:lstStyle>
           <a:p>
@@ -1537,8 +1537,8 @@
         </p:nvSpPr>
         <p:spPr>
           <a:xfrm>
-            <a:off x="12757487" y="5260078"/>
-            <a:ext cx="10713272" cy="7736782"/>
+            <a:off x="10934760" y="4865760"/>
+            <a:ext cx="9182611" cy="7156801"/>
           </a:xfrm>
         </p:spPr>
         <p:txBody>
@@ -1647,7 +1647,7 @@
     </p:spTree>
     <p:extLst>
       <p:ext uri="{BB962C8B-B14F-4D97-AF65-F5344CB8AC3E}">
-        <p14:creationId xmlns:p14="http://schemas.microsoft.com/office/powerpoint/2010/main" val="139041632"/>
+        <p14:creationId xmlns:p14="http://schemas.microsoft.com/office/powerpoint/2010/main" val="3531538765"/>
       </p:ext>
     </p:extLst>
   </p:cSld>
@@ -1762,7 +1762,7 @@
     </p:spTree>
     <p:extLst>
       <p:ext uri="{BB962C8B-B14F-4D97-AF65-F5344CB8AC3E}">
-        <p14:creationId xmlns:p14="http://schemas.microsoft.com/office/powerpoint/2010/main" val="216945067"/>
+        <p14:creationId xmlns:p14="http://schemas.microsoft.com/office/powerpoint/2010/main" val="2474919339"/>
       </p:ext>
     </p:extLst>
   </p:cSld>
@@ -1855,7 +1855,7 @@
     </p:spTree>
     <p:extLst>
       <p:ext uri="{BB962C8B-B14F-4D97-AF65-F5344CB8AC3E}">
-        <p14:creationId xmlns:p14="http://schemas.microsoft.com/office/powerpoint/2010/main" val="4281641341"/>
+        <p14:creationId xmlns:p14="http://schemas.microsoft.com/office/powerpoint/2010/main" val="2001961066"/>
       </p:ext>
     </p:extLst>
   </p:cSld>
@@ -1894,15 +1894,15 @@
         </p:nvSpPr>
         <p:spPr>
           <a:xfrm>
-            <a:off x="1735782" y="960014"/>
-            <a:ext cx="8127647" cy="3360050"/>
+            <a:off x="1487782" y="888048"/>
+            <a:ext cx="6966408" cy="3108166"/>
           </a:xfrm>
         </p:spPr>
         <p:txBody>
           <a:bodyPr anchor="b"/>
           <a:lstStyle>
             <a:lvl1pPr>
-              <a:defRPr sz="6614"/>
+              <a:defRPr sz="5669"/>
             </a:lvl1pPr>
           </a:lstStyle>
           <a:p>
@@ -1925,39 +1925,39 @@
         </p:nvSpPr>
         <p:spPr>
           <a:xfrm>
-            <a:off x="10713272" y="2073365"/>
-            <a:ext cx="12757487" cy="10233485"/>
+            <a:off x="9182611" y="1917937"/>
+            <a:ext cx="10934760" cy="9466340"/>
           </a:xfrm>
         </p:spPr>
         <p:txBody>
           <a:bodyPr/>
           <a:lstStyle>
             <a:lvl1pPr>
-              <a:defRPr sz="6614"/>
+              <a:defRPr sz="5669"/>
             </a:lvl1pPr>
             <a:lvl2pPr>
-              <a:defRPr sz="5787"/>
+              <a:defRPr sz="4960"/>
             </a:lvl2pPr>
             <a:lvl3pPr>
-              <a:defRPr sz="4961"/>
+              <a:defRPr sz="4252"/>
             </a:lvl3pPr>
             <a:lvl4pPr>
-              <a:defRPr sz="4134"/>
+              <a:defRPr sz="3543"/>
             </a:lvl4pPr>
             <a:lvl5pPr>
-              <a:defRPr sz="4134"/>
+              <a:defRPr sz="3543"/>
             </a:lvl5pPr>
             <a:lvl6pPr>
-              <a:defRPr sz="4134"/>
+              <a:defRPr sz="3543"/>
             </a:lvl6pPr>
             <a:lvl7pPr>
-              <a:defRPr sz="4134"/>
+              <a:defRPr sz="3543"/>
             </a:lvl7pPr>
             <a:lvl8pPr>
-              <a:defRPr sz="4134"/>
+              <a:defRPr sz="3543"/>
             </a:lvl8pPr>
             <a:lvl9pPr>
-              <a:defRPr sz="4134"/>
+              <a:defRPr sz="3543"/>
             </a:lvl9pPr>
           </a:lstStyle>
           <a:p>
@@ -2009,8 +2009,8 @@
         </p:nvSpPr>
         <p:spPr>
           <a:xfrm>
-            <a:off x="1735782" y="4320064"/>
-            <a:ext cx="8127647" cy="8003453"/>
+            <a:off x="1487782" y="3996214"/>
+            <a:ext cx="6966408" cy="7403481"/>
           </a:xfrm>
         </p:spPr>
         <p:txBody>
@@ -2018,39 +2018,39 @@
           <a:lstStyle>
             <a:lvl1pPr marL="0" indent="0">
               <a:buNone/>
-              <a:defRPr sz="3307"/>
+              <a:defRPr sz="2835"/>
             </a:lvl1pPr>
-            <a:lvl2pPr marL="944987" indent="0">
-              <a:buNone/>
-              <a:defRPr sz="2894"/>
+            <a:lvl2pPr marL="809976" indent="0">
+              <a:buNone/>
+              <a:defRPr sz="2480"/>
             </a:lvl2pPr>
-            <a:lvl3pPr marL="1889973" indent="0">
-              <a:buNone/>
-              <a:defRPr sz="2480"/>
+            <a:lvl3pPr marL="1619951" indent="0">
+              <a:buNone/>
+              <a:defRPr sz="2126"/>
             </a:lvl3pPr>
-            <a:lvl4pPr marL="2834960" indent="0">
-              <a:buNone/>
-              <a:defRPr sz="2067"/>
+            <a:lvl4pPr marL="2429927" indent="0">
+              <a:buNone/>
+              <a:defRPr sz="1772"/>
             </a:lvl4pPr>
-            <a:lvl5pPr marL="3779947" indent="0">
-              <a:buNone/>
-              <a:defRPr sz="2067"/>
+            <a:lvl5pPr marL="3239902" indent="0">
+              <a:buNone/>
+              <a:defRPr sz="1772"/>
             </a:lvl5pPr>
-            <a:lvl6pPr marL="4724933" indent="0">
-              <a:buNone/>
-              <a:defRPr sz="2067"/>
+            <a:lvl6pPr marL="4049878" indent="0">
+              <a:buNone/>
+              <a:defRPr sz="1772"/>
             </a:lvl6pPr>
-            <a:lvl7pPr marL="5669920" indent="0">
-              <a:buNone/>
-              <a:defRPr sz="2067"/>
+            <a:lvl7pPr marL="4859853" indent="0">
+              <a:buNone/>
+              <a:defRPr sz="1772"/>
             </a:lvl7pPr>
-            <a:lvl8pPr marL="6614907" indent="0">
-              <a:buNone/>
-              <a:defRPr sz="2067"/>
+            <a:lvl8pPr marL="5669829" indent="0">
+              <a:buNone/>
+              <a:defRPr sz="1772"/>
             </a:lvl8pPr>
-            <a:lvl9pPr marL="7559893" indent="0">
-              <a:buNone/>
-              <a:defRPr sz="2067"/>
+            <a:lvl9pPr marL="6479804" indent="0">
+              <a:buNone/>
+              <a:defRPr sz="1772"/>
             </a:lvl9pPr>
           </a:lstStyle>
           <a:p>
@@ -2128,7 +2128,7 @@
     </p:spTree>
     <p:extLst>
       <p:ext uri="{BB962C8B-B14F-4D97-AF65-F5344CB8AC3E}">
-        <p14:creationId xmlns:p14="http://schemas.microsoft.com/office/powerpoint/2010/main" val="3734851919"/>
+        <p14:creationId xmlns:p14="http://schemas.microsoft.com/office/powerpoint/2010/main" val="2744951986"/>
       </p:ext>
     </p:extLst>
   </p:cSld>
@@ -2167,15 +2167,15 @@
         </p:nvSpPr>
         <p:spPr>
           <a:xfrm>
-            <a:off x="1735782" y="960014"/>
-            <a:ext cx="8127647" cy="3360050"/>
+            <a:off x="1487782" y="888048"/>
+            <a:ext cx="6966408" cy="3108166"/>
           </a:xfrm>
         </p:spPr>
         <p:txBody>
           <a:bodyPr anchor="b"/>
           <a:lstStyle>
             <a:lvl1pPr>
-              <a:defRPr sz="6614"/>
+              <a:defRPr sz="5669"/>
             </a:lvl1pPr>
           </a:lstStyle>
           <a:p>
@@ -2198,8 +2198,8 @@
         </p:nvSpPr>
         <p:spPr>
           <a:xfrm>
-            <a:off x="10713272" y="2073365"/>
-            <a:ext cx="12757487" cy="10233485"/>
+            <a:off x="9182611" y="1917937"/>
+            <a:ext cx="10934760" cy="9466340"/>
           </a:xfrm>
         </p:spPr>
         <p:txBody>
@@ -2207,39 +2207,39 @@
           <a:lstStyle>
             <a:lvl1pPr marL="0" indent="0">
               <a:buNone/>
-              <a:defRPr sz="6614"/>
+              <a:defRPr sz="5669"/>
             </a:lvl1pPr>
-            <a:lvl2pPr marL="944987" indent="0">
-              <a:buNone/>
-              <a:defRPr sz="5787"/>
+            <a:lvl2pPr marL="809976" indent="0">
+              <a:buNone/>
+              <a:defRPr sz="4960"/>
             </a:lvl2pPr>
-            <a:lvl3pPr marL="1889973" indent="0">
-              <a:buNone/>
-              <a:defRPr sz="4961"/>
+            <a:lvl3pPr marL="1619951" indent="0">
+              <a:buNone/>
+              <a:defRPr sz="4252"/>
             </a:lvl3pPr>
-            <a:lvl4pPr marL="2834960" indent="0">
-              <a:buNone/>
-              <a:defRPr sz="4134"/>
+            <a:lvl4pPr marL="2429927" indent="0">
+              <a:buNone/>
+              <a:defRPr sz="3543"/>
             </a:lvl4pPr>
-            <a:lvl5pPr marL="3779947" indent="0">
-              <a:buNone/>
-              <a:defRPr sz="4134"/>
+            <a:lvl5pPr marL="3239902" indent="0">
+              <a:buNone/>
+              <a:defRPr sz="3543"/>
             </a:lvl5pPr>
-            <a:lvl6pPr marL="4724933" indent="0">
-              <a:buNone/>
-              <a:defRPr sz="4134"/>
+            <a:lvl6pPr marL="4049878" indent="0">
+              <a:buNone/>
+              <a:defRPr sz="3543"/>
             </a:lvl6pPr>
-            <a:lvl7pPr marL="5669920" indent="0">
-              <a:buNone/>
-              <a:defRPr sz="4134"/>
+            <a:lvl7pPr marL="4859853" indent="0">
+              <a:buNone/>
+              <a:defRPr sz="3543"/>
             </a:lvl7pPr>
-            <a:lvl8pPr marL="6614907" indent="0">
-              <a:buNone/>
-              <a:defRPr sz="4134"/>
+            <a:lvl8pPr marL="5669829" indent="0">
+              <a:buNone/>
+              <a:defRPr sz="3543"/>
             </a:lvl8pPr>
-            <a:lvl9pPr marL="7559893" indent="0">
-              <a:buNone/>
-              <a:defRPr sz="4134"/>
+            <a:lvl9pPr marL="6479804" indent="0">
+              <a:buNone/>
+              <a:defRPr sz="3543"/>
             </a:lvl9pPr>
           </a:lstStyle>
           <a:p>
@@ -2262,8 +2262,8 @@
         </p:nvSpPr>
         <p:spPr>
           <a:xfrm>
-            <a:off x="1735782" y="4320064"/>
-            <a:ext cx="8127647" cy="8003453"/>
+            <a:off x="1487782" y="3996214"/>
+            <a:ext cx="6966408" cy="7403481"/>
           </a:xfrm>
         </p:spPr>
         <p:txBody>
@@ -2271,39 +2271,39 @@
           <a:lstStyle>
             <a:lvl1pPr marL="0" indent="0">
               <a:buNone/>
-              <a:defRPr sz="3307"/>
+              <a:defRPr sz="2835"/>
             </a:lvl1pPr>
-            <a:lvl2pPr marL="944987" indent="0">
-              <a:buNone/>
-              <a:defRPr sz="2894"/>
+            <a:lvl2pPr marL="809976" indent="0">
+              <a:buNone/>
+              <a:defRPr sz="2480"/>
             </a:lvl2pPr>
-            <a:lvl3pPr marL="1889973" indent="0">
-              <a:buNone/>
-              <a:defRPr sz="2480"/>
+            <a:lvl3pPr marL="1619951" indent="0">
+              <a:buNone/>
+              <a:defRPr sz="2126"/>
             </a:lvl3pPr>
-            <a:lvl4pPr marL="2834960" indent="0">
-              <a:buNone/>
-              <a:defRPr sz="2067"/>
+            <a:lvl4pPr marL="2429927" indent="0">
+              <a:buNone/>
+              <a:defRPr sz="1772"/>
             </a:lvl4pPr>
-            <a:lvl5pPr marL="3779947" indent="0">
-              <a:buNone/>
-              <a:defRPr sz="2067"/>
+            <a:lvl5pPr marL="3239902" indent="0">
+              <a:buNone/>
+              <a:defRPr sz="1772"/>
             </a:lvl5pPr>
-            <a:lvl6pPr marL="4724933" indent="0">
-              <a:buNone/>
-              <a:defRPr sz="2067"/>
+            <a:lvl6pPr marL="4049878" indent="0">
+              <a:buNone/>
+              <a:defRPr sz="1772"/>
             </a:lvl6pPr>
-            <a:lvl7pPr marL="5669920" indent="0">
-              <a:buNone/>
-              <a:defRPr sz="2067"/>
+            <a:lvl7pPr marL="4859853" indent="0">
+              <a:buNone/>
+              <a:defRPr sz="1772"/>
             </a:lvl7pPr>
-            <a:lvl8pPr marL="6614907" indent="0">
-              <a:buNone/>
-              <a:defRPr sz="2067"/>
+            <a:lvl8pPr marL="5669829" indent="0">
+              <a:buNone/>
+              <a:defRPr sz="1772"/>
             </a:lvl8pPr>
-            <a:lvl9pPr marL="7559893" indent="0">
-              <a:buNone/>
-              <a:defRPr sz="2067"/>
+            <a:lvl9pPr marL="6479804" indent="0">
+              <a:buNone/>
+              <a:defRPr sz="1772"/>
             </a:lvl9pPr>
           </a:lstStyle>
           <a:p>
@@ -2381,7 +2381,7 @@
     </p:spTree>
     <p:extLst>
       <p:ext uri="{BB962C8B-B14F-4D97-AF65-F5344CB8AC3E}">
-        <p14:creationId xmlns:p14="http://schemas.microsoft.com/office/powerpoint/2010/main" val="2525436443"/>
+        <p14:creationId xmlns:p14="http://schemas.microsoft.com/office/powerpoint/2010/main" val="4211706122"/>
       </p:ext>
     </p:extLst>
   </p:cSld>
@@ -2425,8 +2425,8 @@
         </p:nvSpPr>
         <p:spPr>
           <a:xfrm>
-            <a:off x="1732499" y="766679"/>
-            <a:ext cx="21734978" cy="2783376"/>
+            <a:off x="1484968" y="709206"/>
+            <a:ext cx="18629590" cy="2574722"/>
           </a:xfrm>
           <a:prstGeom prst="rect">
             <a:avLst/>
@@ -2457,8 +2457,8 @@
         </p:nvSpPr>
         <p:spPr>
           <a:xfrm>
-            <a:off x="1732499" y="3833390"/>
-            <a:ext cx="21734978" cy="9136803"/>
+            <a:off x="1484968" y="3546023"/>
+            <a:ext cx="18629590" cy="8451870"/>
           </a:xfrm>
           <a:prstGeom prst="rect">
             <a:avLst/>
@@ -2518,8 +2518,8 @@
         </p:nvSpPr>
         <p:spPr>
           <a:xfrm>
-            <a:off x="1732498" y="13346865"/>
-            <a:ext cx="5669994" cy="766678"/>
+            <a:off x="1484967" y="12346328"/>
+            <a:ext cx="4859893" cy="709205"/>
           </a:xfrm>
           <a:prstGeom prst="rect">
             <a:avLst/>
@@ -2529,7 +2529,7 @@
           <a:bodyPr vert="horz" lIns="91440" tIns="45720" rIns="91440" bIns="45720" rtlCol="0" anchor="ctr"/>
           <a:lstStyle>
             <a:lvl1pPr algn="l">
-              <a:defRPr sz="2480">
+              <a:defRPr sz="2126">
                 <a:solidFill>
                   <a:schemeClr val="tx1">
                     <a:tint val="75000"/>
@@ -2558,8 +2558,8 @@
         </p:nvSpPr>
         <p:spPr>
           <a:xfrm>
-            <a:off x="8347492" y="13346865"/>
-            <a:ext cx="8504992" cy="766678"/>
+            <a:off x="7154843" y="12346328"/>
+            <a:ext cx="7289840" cy="709205"/>
           </a:xfrm>
           <a:prstGeom prst="rect">
             <a:avLst/>
@@ -2569,7 +2569,7 @@
           <a:bodyPr vert="horz" lIns="91440" tIns="45720" rIns="91440" bIns="45720" rtlCol="0" anchor="ctr"/>
           <a:lstStyle>
             <a:lvl1pPr algn="ctr">
-              <a:defRPr sz="2480">
+              <a:defRPr sz="2126">
                 <a:solidFill>
                   <a:schemeClr val="tx1">
                     <a:tint val="75000"/>
@@ -2595,8 +2595,8 @@
         </p:nvSpPr>
         <p:spPr>
           <a:xfrm>
-            <a:off x="17797483" y="13346865"/>
-            <a:ext cx="5669994" cy="766678"/>
+            <a:off x="15254665" y="12346328"/>
+            <a:ext cx="4859893" cy="709205"/>
           </a:xfrm>
           <a:prstGeom prst="rect">
             <a:avLst/>
@@ -2606,7 +2606,7 @@
           <a:bodyPr vert="horz" lIns="91440" tIns="45720" rIns="91440" bIns="45720" rtlCol="0" anchor="ctr"/>
           <a:lstStyle>
             <a:lvl1pPr algn="r">
-              <a:defRPr sz="2480">
+              <a:defRPr sz="2126">
                 <a:solidFill>
                   <a:schemeClr val="tx1">
                     <a:tint val="75000"/>
@@ -2626,27 +2626,27 @@
     </p:spTree>
     <p:extLst>
       <p:ext uri="{BB962C8B-B14F-4D97-AF65-F5344CB8AC3E}">
-        <p14:creationId xmlns:p14="http://schemas.microsoft.com/office/powerpoint/2010/main" val="705811315"/>
+        <p14:creationId xmlns:p14="http://schemas.microsoft.com/office/powerpoint/2010/main" val="3053623659"/>
       </p:ext>
     </p:extLst>
   </p:cSld>
   <p:clrMap bg1="lt1" tx1="dk1" bg2="lt2" tx2="dk2" accent1="accent1" accent2="accent2" accent3="accent3" accent4="accent4" accent5="accent5" accent6="accent6" hlink="hlink" folHlink="folHlink"/>
   <p:sldLayoutIdLst>
-    <p:sldLayoutId id="2147483709" r:id="rId1"/>
-    <p:sldLayoutId id="2147483710" r:id="rId2"/>
-    <p:sldLayoutId id="2147483711" r:id="rId3"/>
-    <p:sldLayoutId id="2147483712" r:id="rId4"/>
-    <p:sldLayoutId id="2147483713" r:id="rId5"/>
-    <p:sldLayoutId id="2147483714" r:id="rId6"/>
-    <p:sldLayoutId id="2147483715" r:id="rId7"/>
-    <p:sldLayoutId id="2147483716" r:id="rId8"/>
-    <p:sldLayoutId id="2147483717" r:id="rId9"/>
-    <p:sldLayoutId id="2147483718" r:id="rId10"/>
-    <p:sldLayoutId id="2147483719" r:id="rId11"/>
+    <p:sldLayoutId id="2147483733" r:id="rId1"/>
+    <p:sldLayoutId id="2147483734" r:id="rId2"/>
+    <p:sldLayoutId id="2147483735" r:id="rId3"/>
+    <p:sldLayoutId id="2147483736" r:id="rId4"/>
+    <p:sldLayoutId id="2147483737" r:id="rId5"/>
+    <p:sldLayoutId id="2147483738" r:id="rId6"/>
+    <p:sldLayoutId id="2147483739" r:id="rId7"/>
+    <p:sldLayoutId id="2147483740" r:id="rId8"/>
+    <p:sldLayoutId id="2147483741" r:id="rId9"/>
+    <p:sldLayoutId id="2147483742" r:id="rId10"/>
+    <p:sldLayoutId id="2147483743" r:id="rId11"/>
   </p:sldLayoutIdLst>
   <p:txStyles>
     <p:titleStyle>
-      <a:lvl1pPr algn="l" defTabSz="1889973" rtl="0" eaLnBrk="1" latinLnBrk="0" hangingPunct="1">
+      <a:lvl1pPr algn="l" defTabSz="1619951" rtl="0" eaLnBrk="1" latinLnBrk="0" hangingPunct="1">
         <a:lnSpc>
           <a:spcPct val="90000"/>
         </a:lnSpc>
@@ -2654,7 +2654,7 @@
           <a:spcPct val="0"/>
         </a:spcBef>
         <a:buNone/>
-        <a:defRPr sz="9094" kern="1200">
+        <a:defRPr sz="7795" kern="1200">
           <a:solidFill>
             <a:schemeClr val="tx1"/>
           </a:solidFill>
@@ -2665,16 +2665,16 @@
       </a:lvl1pPr>
     </p:titleStyle>
     <p:bodyStyle>
-      <a:lvl1pPr marL="472493" indent="-472493" algn="l" defTabSz="1889973" rtl="0" eaLnBrk="1" latinLnBrk="0" hangingPunct="1">
+      <a:lvl1pPr marL="404988" indent="-404988" algn="l" defTabSz="1619951" rtl="0" eaLnBrk="1" latinLnBrk="0" hangingPunct="1">
         <a:lnSpc>
           <a:spcPct val="90000"/>
         </a:lnSpc>
         <a:spcBef>
-          <a:spcPts val="2067"/>
+          <a:spcPts val="1772"/>
         </a:spcBef>
         <a:buFont typeface="Arial" panose="020B0604020202020204" pitchFamily="34" charset="0"/>
         <a:buChar char="•"/>
-        <a:defRPr sz="5787" kern="1200">
+        <a:defRPr sz="4960" kern="1200">
           <a:solidFill>
             <a:schemeClr val="tx1"/>
           </a:solidFill>
@@ -2683,16 +2683,16 @@
           <a:cs typeface="+mn-cs"/>
         </a:defRPr>
       </a:lvl1pPr>
-      <a:lvl2pPr marL="1417480" indent="-472493" algn="l" defTabSz="1889973" rtl="0" eaLnBrk="1" latinLnBrk="0" hangingPunct="1">
+      <a:lvl2pPr marL="1214963" indent="-404988" algn="l" defTabSz="1619951" rtl="0" eaLnBrk="1" latinLnBrk="0" hangingPunct="1">
         <a:lnSpc>
           <a:spcPct val="90000"/>
         </a:lnSpc>
         <a:spcBef>
-          <a:spcPts val="1033"/>
+          <a:spcPts val="886"/>
         </a:spcBef>
         <a:buFont typeface="Arial" panose="020B0604020202020204" pitchFamily="34" charset="0"/>
         <a:buChar char="•"/>
-        <a:defRPr sz="4961" kern="1200">
+        <a:defRPr sz="4252" kern="1200">
           <a:solidFill>
             <a:schemeClr val="tx1"/>
           </a:solidFill>
@@ -2701,16 +2701,16 @@
           <a:cs typeface="+mn-cs"/>
         </a:defRPr>
       </a:lvl2pPr>
-      <a:lvl3pPr marL="2362467" indent="-472493" algn="l" defTabSz="1889973" rtl="0" eaLnBrk="1" latinLnBrk="0" hangingPunct="1">
+      <a:lvl3pPr marL="2024939" indent="-404988" algn="l" defTabSz="1619951" rtl="0" eaLnBrk="1" latinLnBrk="0" hangingPunct="1">
         <a:lnSpc>
           <a:spcPct val="90000"/>
         </a:lnSpc>
         <a:spcBef>
-          <a:spcPts val="1033"/>
+          <a:spcPts val="886"/>
         </a:spcBef>
         <a:buFont typeface="Arial" panose="020B0604020202020204" pitchFamily="34" charset="0"/>
         <a:buChar char="•"/>
-        <a:defRPr sz="4134" kern="1200">
+        <a:defRPr sz="3543" kern="1200">
           <a:solidFill>
             <a:schemeClr val="tx1"/>
           </a:solidFill>
@@ -2719,16 +2719,16 @@
           <a:cs typeface="+mn-cs"/>
         </a:defRPr>
       </a:lvl3pPr>
-      <a:lvl4pPr marL="3307453" indent="-472493" algn="l" defTabSz="1889973" rtl="0" eaLnBrk="1" latinLnBrk="0" hangingPunct="1">
+      <a:lvl4pPr marL="2834914" indent="-404988" algn="l" defTabSz="1619951" rtl="0" eaLnBrk="1" latinLnBrk="0" hangingPunct="1">
         <a:lnSpc>
           <a:spcPct val="90000"/>
         </a:lnSpc>
         <a:spcBef>
-          <a:spcPts val="1033"/>
+          <a:spcPts val="886"/>
         </a:spcBef>
         <a:buFont typeface="Arial" panose="020B0604020202020204" pitchFamily="34" charset="0"/>
         <a:buChar char="•"/>
-        <a:defRPr sz="3720" kern="1200">
+        <a:defRPr sz="3189" kern="1200">
           <a:solidFill>
             <a:schemeClr val="tx1"/>
           </a:solidFill>
@@ -2737,16 +2737,16 @@
           <a:cs typeface="+mn-cs"/>
         </a:defRPr>
       </a:lvl4pPr>
-      <a:lvl5pPr marL="4252440" indent="-472493" algn="l" defTabSz="1889973" rtl="0" eaLnBrk="1" latinLnBrk="0" hangingPunct="1">
+      <a:lvl5pPr marL="3644890" indent="-404988" algn="l" defTabSz="1619951" rtl="0" eaLnBrk="1" latinLnBrk="0" hangingPunct="1">
         <a:lnSpc>
           <a:spcPct val="90000"/>
         </a:lnSpc>
         <a:spcBef>
-          <a:spcPts val="1033"/>
+          <a:spcPts val="886"/>
         </a:spcBef>
         <a:buFont typeface="Arial" panose="020B0604020202020204" pitchFamily="34" charset="0"/>
         <a:buChar char="•"/>
-        <a:defRPr sz="3720" kern="1200">
+        <a:defRPr sz="3189" kern="1200">
           <a:solidFill>
             <a:schemeClr val="tx1"/>
           </a:solidFill>
@@ -2755,16 +2755,16 @@
           <a:cs typeface="+mn-cs"/>
         </a:defRPr>
       </a:lvl5pPr>
-      <a:lvl6pPr marL="5197427" indent="-472493" algn="l" defTabSz="1889973" rtl="0" eaLnBrk="1" latinLnBrk="0" hangingPunct="1">
+      <a:lvl6pPr marL="4454865" indent="-404988" algn="l" defTabSz="1619951" rtl="0" eaLnBrk="1" latinLnBrk="0" hangingPunct="1">
         <a:lnSpc>
           <a:spcPct val="90000"/>
         </a:lnSpc>
         <a:spcBef>
-          <a:spcPts val="1033"/>
+          <a:spcPts val="886"/>
         </a:spcBef>
         <a:buFont typeface="Arial" panose="020B0604020202020204" pitchFamily="34" charset="0"/>
         <a:buChar char="•"/>
-        <a:defRPr sz="3720" kern="1200">
+        <a:defRPr sz="3189" kern="1200">
           <a:solidFill>
             <a:schemeClr val="tx1"/>
           </a:solidFill>
@@ -2773,16 +2773,16 @@
           <a:cs typeface="+mn-cs"/>
         </a:defRPr>
       </a:lvl6pPr>
-      <a:lvl7pPr marL="6142413" indent="-472493" algn="l" defTabSz="1889973" rtl="0" eaLnBrk="1" latinLnBrk="0" hangingPunct="1">
+      <a:lvl7pPr marL="5264841" indent="-404988" algn="l" defTabSz="1619951" rtl="0" eaLnBrk="1" latinLnBrk="0" hangingPunct="1">
         <a:lnSpc>
           <a:spcPct val="90000"/>
         </a:lnSpc>
         <a:spcBef>
-          <a:spcPts val="1033"/>
+          <a:spcPts val="886"/>
         </a:spcBef>
         <a:buFont typeface="Arial" panose="020B0604020202020204" pitchFamily="34" charset="0"/>
         <a:buChar char="•"/>
-        <a:defRPr sz="3720" kern="1200">
+        <a:defRPr sz="3189" kern="1200">
           <a:solidFill>
             <a:schemeClr val="tx1"/>
           </a:solidFill>
@@ -2791,16 +2791,16 @@
           <a:cs typeface="+mn-cs"/>
         </a:defRPr>
       </a:lvl7pPr>
-      <a:lvl8pPr marL="7087400" indent="-472493" algn="l" defTabSz="1889973" rtl="0" eaLnBrk="1" latinLnBrk="0" hangingPunct="1">
+      <a:lvl8pPr marL="6074816" indent="-404988" algn="l" defTabSz="1619951" rtl="0" eaLnBrk="1" latinLnBrk="0" hangingPunct="1">
         <a:lnSpc>
           <a:spcPct val="90000"/>
         </a:lnSpc>
         <a:spcBef>
-          <a:spcPts val="1033"/>
+          <a:spcPts val="886"/>
         </a:spcBef>
         <a:buFont typeface="Arial" panose="020B0604020202020204" pitchFamily="34" charset="0"/>
         <a:buChar char="•"/>
-        <a:defRPr sz="3720" kern="1200">
+        <a:defRPr sz="3189" kern="1200">
           <a:solidFill>
             <a:schemeClr val="tx1"/>
           </a:solidFill>
@@ -2809,16 +2809,16 @@
           <a:cs typeface="+mn-cs"/>
         </a:defRPr>
       </a:lvl8pPr>
-      <a:lvl9pPr marL="8032387" indent="-472493" algn="l" defTabSz="1889973" rtl="0" eaLnBrk="1" latinLnBrk="0" hangingPunct="1">
+      <a:lvl9pPr marL="6884792" indent="-404988" algn="l" defTabSz="1619951" rtl="0" eaLnBrk="1" latinLnBrk="0" hangingPunct="1">
         <a:lnSpc>
           <a:spcPct val="90000"/>
         </a:lnSpc>
         <a:spcBef>
-          <a:spcPts val="1033"/>
+          <a:spcPts val="886"/>
         </a:spcBef>
         <a:buFont typeface="Arial" panose="020B0604020202020204" pitchFamily="34" charset="0"/>
         <a:buChar char="•"/>
-        <a:defRPr sz="3720" kern="1200">
+        <a:defRPr sz="3189" kern="1200">
           <a:solidFill>
             <a:schemeClr val="tx1"/>
           </a:solidFill>
@@ -2832,8 +2832,8 @@
       <a:defPPr>
         <a:defRPr lang="en-US"/>
       </a:defPPr>
-      <a:lvl1pPr marL="0" algn="l" defTabSz="1889973" rtl="0" eaLnBrk="1" latinLnBrk="0" hangingPunct="1">
-        <a:defRPr sz="3720" kern="1200">
+      <a:lvl1pPr marL="0" algn="l" defTabSz="1619951" rtl="0" eaLnBrk="1" latinLnBrk="0" hangingPunct="1">
+        <a:defRPr sz="3189" kern="1200">
           <a:solidFill>
             <a:schemeClr val="tx1"/>
           </a:solidFill>
@@ -2842,8 +2842,8 @@
           <a:cs typeface="+mn-cs"/>
         </a:defRPr>
       </a:lvl1pPr>
-      <a:lvl2pPr marL="944987" algn="l" defTabSz="1889973" rtl="0" eaLnBrk="1" latinLnBrk="0" hangingPunct="1">
-        <a:defRPr sz="3720" kern="1200">
+      <a:lvl2pPr marL="809976" algn="l" defTabSz="1619951" rtl="0" eaLnBrk="1" latinLnBrk="0" hangingPunct="1">
+        <a:defRPr sz="3189" kern="1200">
           <a:solidFill>
             <a:schemeClr val="tx1"/>
           </a:solidFill>
@@ -2852,8 +2852,8 @@
           <a:cs typeface="+mn-cs"/>
         </a:defRPr>
       </a:lvl2pPr>
-      <a:lvl3pPr marL="1889973" algn="l" defTabSz="1889973" rtl="0" eaLnBrk="1" latinLnBrk="0" hangingPunct="1">
-        <a:defRPr sz="3720" kern="1200">
+      <a:lvl3pPr marL="1619951" algn="l" defTabSz="1619951" rtl="0" eaLnBrk="1" latinLnBrk="0" hangingPunct="1">
+        <a:defRPr sz="3189" kern="1200">
           <a:solidFill>
             <a:schemeClr val="tx1"/>
           </a:solidFill>
@@ -2862,8 +2862,8 @@
           <a:cs typeface="+mn-cs"/>
         </a:defRPr>
       </a:lvl3pPr>
-      <a:lvl4pPr marL="2834960" algn="l" defTabSz="1889973" rtl="0" eaLnBrk="1" latinLnBrk="0" hangingPunct="1">
-        <a:defRPr sz="3720" kern="1200">
+      <a:lvl4pPr marL="2429927" algn="l" defTabSz="1619951" rtl="0" eaLnBrk="1" latinLnBrk="0" hangingPunct="1">
+        <a:defRPr sz="3189" kern="1200">
           <a:solidFill>
             <a:schemeClr val="tx1"/>
           </a:solidFill>
@@ -2872,8 +2872,8 @@
           <a:cs typeface="+mn-cs"/>
         </a:defRPr>
       </a:lvl4pPr>
-      <a:lvl5pPr marL="3779947" algn="l" defTabSz="1889973" rtl="0" eaLnBrk="1" latinLnBrk="0" hangingPunct="1">
-        <a:defRPr sz="3720" kern="1200">
+      <a:lvl5pPr marL="3239902" algn="l" defTabSz="1619951" rtl="0" eaLnBrk="1" latinLnBrk="0" hangingPunct="1">
+        <a:defRPr sz="3189" kern="1200">
           <a:solidFill>
             <a:schemeClr val="tx1"/>
           </a:solidFill>
@@ -2882,8 +2882,8 @@
           <a:cs typeface="+mn-cs"/>
         </a:defRPr>
       </a:lvl5pPr>
-      <a:lvl6pPr marL="4724933" algn="l" defTabSz="1889973" rtl="0" eaLnBrk="1" latinLnBrk="0" hangingPunct="1">
-        <a:defRPr sz="3720" kern="1200">
+      <a:lvl6pPr marL="4049878" algn="l" defTabSz="1619951" rtl="0" eaLnBrk="1" latinLnBrk="0" hangingPunct="1">
+        <a:defRPr sz="3189" kern="1200">
           <a:solidFill>
             <a:schemeClr val="tx1"/>
           </a:solidFill>
@@ -2892,8 +2892,8 @@
           <a:cs typeface="+mn-cs"/>
         </a:defRPr>
       </a:lvl6pPr>
-      <a:lvl7pPr marL="5669920" algn="l" defTabSz="1889973" rtl="0" eaLnBrk="1" latinLnBrk="0" hangingPunct="1">
-        <a:defRPr sz="3720" kern="1200">
+      <a:lvl7pPr marL="4859853" algn="l" defTabSz="1619951" rtl="0" eaLnBrk="1" latinLnBrk="0" hangingPunct="1">
+        <a:defRPr sz="3189" kern="1200">
           <a:solidFill>
             <a:schemeClr val="tx1"/>
           </a:solidFill>
@@ -2902,8 +2902,8 @@
           <a:cs typeface="+mn-cs"/>
         </a:defRPr>
       </a:lvl7pPr>
-      <a:lvl8pPr marL="6614907" algn="l" defTabSz="1889973" rtl="0" eaLnBrk="1" latinLnBrk="0" hangingPunct="1">
-        <a:defRPr sz="3720" kern="1200">
+      <a:lvl8pPr marL="5669829" algn="l" defTabSz="1619951" rtl="0" eaLnBrk="1" latinLnBrk="0" hangingPunct="1">
+        <a:defRPr sz="3189" kern="1200">
           <a:solidFill>
             <a:schemeClr val="tx1"/>
           </a:solidFill>
@@ -2912,8 +2912,8 @@
           <a:cs typeface="+mn-cs"/>
         </a:defRPr>
       </a:lvl8pPr>
-      <a:lvl9pPr marL="7559893" algn="l" defTabSz="1889973" rtl="0" eaLnBrk="1" latinLnBrk="0" hangingPunct="1">
-        <a:defRPr sz="3720" kern="1200">
+      <a:lvl9pPr marL="6479804" algn="l" defTabSz="1619951" rtl="0" eaLnBrk="1" latinLnBrk="0" hangingPunct="1">
+        <a:defRPr sz="3189" kern="1200">
           <a:solidFill>
             <a:schemeClr val="tx1"/>
           </a:solidFill>
@@ -2958,8 +2958,8 @@
         </p:nvSpPr>
         <p:spPr>
           <a:xfrm>
-            <a:off x="8880841" y="8528263"/>
-            <a:ext cx="11723077" cy="3807229"/>
+            <a:off x="4902353" y="7638693"/>
+            <a:ext cx="11723077" cy="3718156"/>
           </a:xfrm>
           <a:prstGeom prst="roundRect">
             <a:avLst/>
@@ -3012,8 +3012,8 @@
         </p:nvSpPr>
         <p:spPr>
           <a:xfrm>
-            <a:off x="9882187" y="8745993"/>
-            <a:ext cx="1823102" cy="621389"/>
+            <a:off x="5903693" y="7985008"/>
+            <a:ext cx="1823102" cy="538481"/>
           </a:xfrm>
           <a:prstGeom prst="rect">
             <a:avLst/>
@@ -3047,16 +3047,6 @@
             </a:r>
             <a:endParaRPr lang="en-DE" sz="1100"/>
           </a:p>
-          <a:p>
-            <a:pPr marL="171450" indent="-171450">
-              <a:buFontTx/>
-              <a:buChar char="-"/>
-            </a:pPr>
-            <a:r>
-              <a:rPr lang="en-DE" sz="1100"/>
-              <a:t>ds</a:t>
-            </a:r>
-          </a:p>
         </p:txBody>
       </p:sp>
       <p:sp>
@@ -3073,8 +3063,8 @@
         </p:nvSpPr>
         <p:spPr>
           <a:xfrm>
-            <a:off x="18345246" y="11059529"/>
-            <a:ext cx="1823102" cy="621389"/>
+            <a:off x="14625269" y="10321539"/>
+            <a:ext cx="1621213" cy="369204"/>
           </a:xfrm>
           <a:prstGeom prst="rect">
             <a:avLst/>
@@ -3092,33 +3082,10 @@
           </a:bodyPr>
           <a:lstStyle/>
           <a:p>
+            <a:pPr algn="ctr"/>
             <a:r>
               <a:rPr lang="en-DE" b="1"/>
               <a:t>MODEL</a:t>
-            </a:r>
-          </a:p>
-          <a:p>
-            <a:pPr marL="171450" indent="-171450">
-              <a:buFontTx/>
-              <a:buChar char="-"/>
-            </a:pPr>
-            <a:r>
-              <a:rPr lang="en-US" sz="1100"/>
-              <a:t>D</a:t>
-            </a:r>
-            <a:r>
-              <a:rPr lang="en-DE" sz="1100"/>
-              <a:t>ssd</a:t>
-            </a:r>
-          </a:p>
-          <a:p>
-            <a:pPr marL="171450" indent="-171450">
-              <a:buFontTx/>
-              <a:buChar char="-"/>
-            </a:pPr>
-            <a:r>
-              <a:rPr lang="en-DE" sz="1100"/>
-              <a:t>ds</a:t>
             </a:r>
           </a:p>
         </p:txBody>
@@ -3137,8 +3104,8 @@
         </p:nvSpPr>
         <p:spPr>
           <a:xfrm>
-            <a:off x="13166904" y="11078403"/>
-            <a:ext cx="2312007" cy="621389"/>
+            <a:off x="8619305" y="10292514"/>
+            <a:ext cx="2312007" cy="538481"/>
           </a:xfrm>
           <a:prstGeom prst="rect">
             <a:avLst/>
@@ -3168,21 +3135,27 @@
             </a:pPr>
             <a:r>
               <a:rPr lang="en-US" sz="1100"/>
-              <a:t>D</a:t>
+              <a:t>A</a:t>
             </a:r>
             <a:r>
               <a:rPr lang="en-DE" sz="1100"/>
-              <a:t>ssd</a:t>
-            </a:r>
-          </a:p>
-          <a:p>
-            <a:pPr marL="171450" indent="-171450">
-              <a:buFontTx/>
-              <a:buChar char="-"/>
-            </a:pPr>
+              <a:t>ccuracy; </a:t>
+            </a:r>
+            <a:r>
+              <a:rPr lang="de-DE" sz="1100"/>
+              <a:t>Precision</a:t>
+            </a:r>
             <a:r>
               <a:rPr lang="en-DE" sz="1100"/>
-              <a:t>ds</a:t>
+              <a:t>; </a:t>
+            </a:r>
+            <a:r>
+              <a:rPr lang="en-US" sz="1100"/>
+              <a:t>R</a:t>
+            </a:r>
+            <a:r>
+              <a:rPr lang="en-DE" sz="1100"/>
+              <a:t>ecall</a:t>
             </a:r>
           </a:p>
         </p:txBody>
@@ -3201,8 +3174,8 @@
         </p:nvSpPr>
         <p:spPr>
           <a:xfrm>
-            <a:off x="9205322" y="11031648"/>
-            <a:ext cx="3346881" cy="790666"/>
+            <a:off x="5574583" y="10292514"/>
+            <a:ext cx="2439352" cy="877035"/>
           </a:xfrm>
           <a:prstGeom prst="rect">
             <a:avLst/>
@@ -3272,8 +3245,8 @@
         </p:nvSpPr>
         <p:spPr>
           <a:xfrm>
-            <a:off x="15704355" y="11069420"/>
-            <a:ext cx="2312007" cy="621389"/>
+            <a:off x="11551107" y="10321538"/>
+            <a:ext cx="2312007" cy="369204"/>
           </a:xfrm>
           <a:prstGeom prst="rect">
             <a:avLst/>
@@ -3291,33 +3264,10 @@
           </a:bodyPr>
           <a:lstStyle/>
           <a:p>
+            <a:pPr algn="ctr"/>
             <a:r>
               <a:rPr lang="en-DE" b="1"/>
               <a:t>MODEL PACKAGING</a:t>
-            </a:r>
-          </a:p>
-          <a:p>
-            <a:pPr marL="171450" indent="-171450">
-              <a:buFontTx/>
-              <a:buChar char="-"/>
-            </a:pPr>
-            <a:r>
-              <a:rPr lang="en-US" sz="1100"/>
-              <a:t>D</a:t>
-            </a:r>
-            <a:r>
-              <a:rPr lang="en-DE" sz="1100"/>
-              <a:t>ssd</a:t>
-            </a:r>
-          </a:p>
-          <a:p>
-            <a:pPr marL="171450" indent="-171450">
-              <a:buFontTx/>
-              <a:buChar char="-"/>
-            </a:pPr>
-            <a:r>
-              <a:rPr lang="en-DE" sz="1100"/>
-              <a:t>ds</a:t>
             </a:r>
           </a:p>
         </p:txBody>
@@ -3336,8 +3286,8 @@
         </p:nvSpPr>
         <p:spPr>
           <a:xfrm>
-            <a:off x="12704086" y="8725673"/>
-            <a:ext cx="1823102" cy="621389"/>
+            <a:off x="8725592" y="7964688"/>
+            <a:ext cx="1823102" cy="538481"/>
           </a:xfrm>
           <a:prstGeom prst="rect">
             <a:avLst/>
@@ -3370,16 +3320,6 @@
               <a:t>20%</a:t>
             </a:r>
             <a:endParaRPr lang="en-DE" sz="1100"/>
-          </a:p>
-          <a:p>
-            <a:pPr marL="171450" indent="-171450">
-              <a:buFontTx/>
-              <a:buChar char="-"/>
-            </a:pPr>
-            <a:r>
-              <a:rPr lang="en-DE" sz="1100"/>
-              <a:t>ds</a:t>
-            </a:r>
           </a:p>
         </p:txBody>
       </p:sp>
@@ -3405,7 +3345,7 @@
         </p:blipFill>
         <p:spPr>
           <a:xfrm>
-            <a:off x="18549924" y="7593759"/>
+            <a:off x="14571430" y="6704182"/>
             <a:ext cx="1207294" cy="851460"/>
           </a:xfrm>
           <a:prstGeom prst="rect">
@@ -3427,8 +3367,8 @@
         </p:nvSpPr>
         <p:spPr>
           <a:xfrm>
-            <a:off x="15552263" y="8641224"/>
-            <a:ext cx="4100004" cy="1637051"/>
+            <a:off x="11573775" y="7751647"/>
+            <a:ext cx="4530031" cy="1892826"/>
           </a:xfrm>
           <a:prstGeom prst="rect">
             <a:avLst/>
@@ -3458,7 +3398,7 @@
             </a:pPr>
             <a:r>
               <a:rPr lang="en-DE" sz="1100"/>
-              <a:t>Figure out the most important instruments for suppliers via reaction to price changes ?!</a:t>
+              <a:t>Identify the most important instruments for suppliers via reactions to price changes</a:t>
             </a:r>
           </a:p>
           <a:p>
@@ -3492,20 +3432,31 @@
             </a:r>
           </a:p>
           <a:p>
-            <a:pPr marL="628650" lvl="1" indent="-171450">
+            <a:pPr marL="171450" indent="-171450">
               <a:buFontTx/>
               <a:buChar char="-"/>
             </a:pPr>
             <a:r>
               <a:rPr lang="en-DE" sz="1100"/>
-              <a:t>Moving average time window (e.g. 7 days for short-term period or longer for wider trends)</a:t>
-            </a:r>
-          </a:p>
-          <a:p>
+              <a:t>Moving average time window (e.g. 7 days for a short-term period or longer for wider trends)</a:t>
+            </a:r>
+          </a:p>
+          <a:p>
+            <a:pPr marL="171450" indent="-171450">
+              <a:buFontTx/>
+              <a:buChar char="-"/>
+            </a:pPr>
             <a:r>
               <a:rPr lang="en-DE" sz="1100"/>
-              <a:t>- Segmentation of postcodes (what’s the effect on pricing strategy?)</a:t>
-            </a:r>
+              <a:t>Segmentation of postcodes to see what the effect is on pricing strategy</a:t>
+            </a:r>
+          </a:p>
+          <a:p>
+            <a:pPr marL="171450" indent="-171450">
+              <a:buFontTx/>
+              <a:buChar char="-"/>
+            </a:pPr>
+            <a:endParaRPr lang="en-DE" sz="1100"/>
           </a:p>
         </p:txBody>
       </p:sp>
@@ -3523,8 +3474,8 @@
         </p:nvSpPr>
         <p:spPr>
           <a:xfrm>
-            <a:off x="10065714" y="10112641"/>
-            <a:ext cx="2249180" cy="430887"/>
+            <a:off x="7633581" y="9685167"/>
+            <a:ext cx="2249180" cy="600164"/>
           </a:xfrm>
           <a:prstGeom prst="rect">
             <a:avLst/>
@@ -3541,8 +3492,8 @@
           <a:lstStyle/>
           <a:p>
             <a:pPr marL="171450" indent="-171450">
-              <a:buFontTx/>
-              <a:buChar char="-"/>
+              <a:buFont typeface="Wingdings" pitchFamily="2" charset="2"/>
+              <a:buChar char="Ø"/>
             </a:pPr>
             <a:r>
               <a:rPr lang="en-DE" sz="1100"/>
@@ -3551,106 +3502,22 @@
           </a:p>
           <a:p>
             <a:pPr marL="171450" indent="-171450">
-              <a:buFontTx/>
-              <a:buChar char="-"/>
+              <a:buFont typeface="Wingdings" pitchFamily="2" charset="2"/>
+              <a:buChar char="Ø"/>
             </a:pPr>
             <a:r>
               <a:rPr lang="en-DE" sz="1100"/>
               <a:t>Hyperparameter Tuning</a:t>
             </a:r>
           </a:p>
-        </p:txBody>
-      </p:sp>
-      <p:sp>
-        <p:nvSpPr>
-          <p:cNvPr id="16" name="TextBox 15">
-            <a:extLst>
-              <a:ext uri="{FF2B5EF4-FFF2-40B4-BE49-F238E27FC236}">
-                <a16:creationId xmlns:a16="http://schemas.microsoft.com/office/drawing/2014/main" id="{716AD067-A8B9-F8EA-D3DA-BF7D5CD7D8D3}"/>
-              </a:ext>
-            </a:extLst>
-          </p:cNvPr>
-          <p:cNvSpPr txBox="1"/>
-          <p:nvPr/>
-        </p:nvSpPr>
-        <p:spPr>
-          <a:xfrm>
-            <a:off x="13057980" y="10004677"/>
-            <a:ext cx="2228714" cy="938719"/>
-          </a:xfrm>
-          <a:prstGeom prst="rect">
-            <a:avLst/>
-          </a:prstGeom>
-          <a:noFill/>
-          <a:ln w="25400">
-            <a:noFill/>
-          </a:ln>
-        </p:spPr>
-        <p:txBody>
-          <a:bodyPr wrap="square" rtlCol="0">
-            <a:spAutoFit/>
-          </a:bodyPr>
-          <a:lstStyle/>
           <a:p>
             <a:pPr marL="171450" indent="-171450">
-              <a:buFontTx/>
-              <a:buChar char="-"/>
+              <a:buFont typeface="Wingdings" pitchFamily="2" charset="2"/>
+              <a:buChar char="Ø"/>
             </a:pPr>
             <a:r>
               <a:rPr lang="en-DE" sz="1100"/>
               <a:t>Best model selection</a:t>
-            </a:r>
-          </a:p>
-          <a:p>
-            <a:pPr marL="171450" indent="-171450">
-              <a:buFontTx/>
-              <a:buChar char="-"/>
-            </a:pPr>
-            <a:r>
-              <a:rPr lang="en-DE" sz="1100"/>
-              <a:t>Model performance metrics</a:t>
-            </a:r>
-          </a:p>
-          <a:p>
-            <a:pPr marL="628650" lvl="1" indent="-171450">
-              <a:buFontTx/>
-              <a:buChar char="-"/>
-            </a:pPr>
-            <a:r>
-              <a:rPr lang="en-US" sz="1100"/>
-              <a:t>A</a:t>
-            </a:r>
-            <a:r>
-              <a:rPr lang="en-DE" sz="1100"/>
-              <a:t>ccuracy</a:t>
-            </a:r>
-          </a:p>
-          <a:p>
-            <a:pPr marL="628650" lvl="1" indent="-171450">
-              <a:buFontTx/>
-              <a:buChar char="-"/>
-            </a:pPr>
-            <a:r>
-              <a:rPr lang="en-US" sz="1100"/>
-              <a:t>P</a:t>
-            </a:r>
-            <a:r>
-              <a:rPr lang="en-DE" sz="1100"/>
-              <a:t>rescision</a:t>
-            </a:r>
-          </a:p>
-          <a:p>
-            <a:pPr marL="628650" lvl="1" indent="-171450">
-              <a:buFontTx/>
-              <a:buChar char="-"/>
-            </a:pPr>
-            <a:r>
-              <a:rPr lang="en-US" sz="1100"/>
-              <a:t>R</a:t>
-            </a:r>
-            <a:r>
-              <a:rPr lang="en-DE" sz="1100"/>
-              <a:t>ecall</a:t>
             </a:r>
           </a:p>
         </p:txBody>
@@ -3669,8 +3536,8 @@
         </p:nvSpPr>
         <p:spPr>
           <a:xfrm>
-            <a:off x="2266838" y="2490909"/>
-            <a:ext cx="11946294" cy="5788726"/>
+            <a:off x="498144" y="1601332"/>
+            <a:ext cx="10877662" cy="5059818"/>
           </a:xfrm>
           <a:prstGeom prst="roundRect">
             <a:avLst/>
@@ -3723,8 +3590,8 @@
         </p:nvSpPr>
         <p:spPr>
           <a:xfrm>
-            <a:off x="3255098" y="3326031"/>
-            <a:ext cx="4705958" cy="790666"/>
+            <a:off x="1480149" y="2031084"/>
+            <a:ext cx="3678050" cy="707758"/>
           </a:xfrm>
           <a:prstGeom prst="rect">
             <a:avLst/>
@@ -3767,13 +3634,6 @@
               <a:t>Power dataset</a:t>
             </a:r>
           </a:p>
-          <a:p>
-            <a:pPr marL="171450" indent="-171450">
-              <a:buFontTx/>
-              <a:buChar char="-"/>
-            </a:pPr>
-            <a:endParaRPr lang="en-DE" sz="1100"/>
-          </a:p>
         </p:txBody>
       </p:sp>
       <p:sp>
@@ -3790,8 +3650,8 @@
         </p:nvSpPr>
         <p:spPr>
           <a:xfrm>
-            <a:off x="3248843" y="6118927"/>
-            <a:ext cx="5287419" cy="1467774"/>
+            <a:off x="1480155" y="5229350"/>
+            <a:ext cx="5287419" cy="1046440"/>
           </a:xfrm>
           <a:prstGeom prst="rect">
             <a:avLst/>
@@ -3841,8 +3701,8 @@
               <a:buChar char="-"/>
             </a:pPr>
             <a:r>
-              <a:rPr lang="en-US" sz="1100"/>
-              <a:t>Basic statistics</a:t>
+              <a:rPr lang="en-DE" sz="1100"/>
+              <a:t>Figuring out correlations between features</a:t>
             </a:r>
           </a:p>
           <a:p>
@@ -3852,28 +3712,8 @@
             </a:pPr>
             <a:r>
               <a:rPr lang="en-DE" sz="1100"/>
-              <a:t>Figuring out correlations between features</a:t>
-            </a:r>
-          </a:p>
-          <a:p>
-            <a:pPr marL="171450" indent="-171450">
-              <a:buFontTx/>
-              <a:buChar char="-"/>
-            </a:pPr>
-            <a:r>
-              <a:rPr lang="en-DE" sz="1100"/>
               <a:t>Deriving first insights based on the average distribution of suppliers’ average ranking</a:t>
             </a:r>
-          </a:p>
-          <a:p>
-            <a:pPr marL="171450" indent="-171450">
-              <a:buFontTx/>
-              <a:buChar char="-"/>
-            </a:pPr>
-            <a:endParaRPr lang="en-DE" sz="1100"/>
-          </a:p>
-          <a:p>
-            <a:endParaRPr lang="en-DE" sz="1100"/>
           </a:p>
         </p:txBody>
       </p:sp>
@@ -3891,8 +3731,8 @@
         </p:nvSpPr>
         <p:spPr>
           <a:xfrm>
-            <a:off x="10718820" y="7371662"/>
-            <a:ext cx="1966923" cy="282834"/>
+            <a:off x="7232648" y="5678522"/>
+            <a:ext cx="1966923" cy="369204"/>
           </a:xfrm>
           <a:prstGeom prst="rect">
             <a:avLst/>
@@ -3910,6 +3750,7 @@
           </a:bodyPr>
           <a:lstStyle/>
           <a:p>
+            <a:pPr algn="ctr"/>
             <a:r>
               <a:rPr lang="en-DE" b="1"/>
               <a:t>MASTER DATA SET</a:t>
@@ -3939,7 +3780,7 @@
         </p:blipFill>
         <p:spPr>
           <a:xfrm>
-            <a:off x="3231651" y="2144477"/>
+            <a:off x="1462963" y="1254906"/>
             <a:ext cx="1961723" cy="338715"/>
           </a:xfrm>
           <a:prstGeom prst="rect">
@@ -3961,7 +3802,7 @@
         </p:nvSpPr>
         <p:spPr>
           <a:xfrm>
-            <a:off x="10943684" y="3103959"/>
+            <a:off x="9303838" y="1711468"/>
             <a:ext cx="1822712" cy="276999"/>
           </a:xfrm>
           <a:prstGeom prst="rect">
@@ -3999,8 +3840,8 @@
         </p:nvSpPr>
         <p:spPr>
           <a:xfrm>
-            <a:off x="3773272" y="4393145"/>
-            <a:ext cx="3719772" cy="790666"/>
+            <a:off x="2118977" y="2833915"/>
+            <a:ext cx="3039222" cy="707758"/>
           </a:xfrm>
           <a:prstGeom prst="rect">
             <a:avLst/>
@@ -4043,13 +3884,6 @@
               <a:t>Spot prices</a:t>
             </a:r>
           </a:p>
-          <a:p>
-            <a:pPr marL="171450" indent="-171450">
-              <a:buFontTx/>
-              <a:buChar char="-"/>
-            </a:pPr>
-            <a:endParaRPr lang="en-DE" sz="1100"/>
-          </a:p>
         </p:txBody>
       </p:sp>
       <p:sp>
@@ -4066,8 +3900,8 @@
         </p:nvSpPr>
         <p:spPr>
           <a:xfrm>
-            <a:off x="8543474" y="3186100"/>
-            <a:ext cx="2166371" cy="959943"/>
+            <a:off x="7132924" y="2092972"/>
+            <a:ext cx="2166371" cy="1323183"/>
           </a:xfrm>
           <a:prstGeom prst="rect">
             <a:avLst/>
@@ -4124,7 +3958,6 @@
               </a:rPr>
               <a:t>Strategy index based on average supplier ranking</a:t>
             </a:r>
-            <a:endParaRPr lang="en-DE" sz="1100"/>
           </a:p>
         </p:txBody>
       </p:sp>
@@ -4142,8 +3975,8 @@
         </p:nvSpPr>
         <p:spPr>
           <a:xfrm>
-            <a:off x="4455097" y="8469909"/>
-            <a:ext cx="4627660" cy="430887"/>
+            <a:off x="5283499" y="2201168"/>
+            <a:ext cx="1734000" cy="430887"/>
           </a:xfrm>
           <a:prstGeom prst="rect">
             <a:avLst/>
@@ -4156,14 +3989,11 @@
           </a:bodyPr>
           <a:lstStyle/>
           <a:p>
+            <a:pPr algn="ctr"/>
             <a:r>
               <a:rPr lang="en-DE" sz="1100"/>
-              <a:t>Merging the competitor and price data sets (for both power and energy)</a:t>
-            </a:r>
-            <a:endParaRPr lang="en-US" sz="1100"/>
-          </a:p>
-          <a:p>
-            <a:endParaRPr lang="en-DE" sz="1100"/>
+              <a:t>Merging the competitor data and energy prices</a:t>
+            </a:r>
           </a:p>
         </p:txBody>
       </p:sp>
@@ -4181,8 +4011,8 @@
         </p:nvSpPr>
         <p:spPr>
           <a:xfrm>
-            <a:off x="8547328" y="4662452"/>
-            <a:ext cx="2166371" cy="1129220"/>
+            <a:off x="6969756" y="4051290"/>
+            <a:ext cx="2492707" cy="1046440"/>
           </a:xfrm>
           <a:prstGeom prst="rect">
             <a:avLst/>
@@ -4261,8 +4091,8 @@
         </p:nvSpPr>
         <p:spPr>
           <a:xfrm>
-            <a:off x="11325119" y="3563876"/>
-            <a:ext cx="2624116" cy="621389"/>
+            <a:off x="2858013" y="3636749"/>
+            <a:ext cx="2300186" cy="538481"/>
           </a:xfrm>
           <a:prstGeom prst="rect">
             <a:avLst/>
@@ -4282,7 +4112,7 @@
           <a:p>
             <a:r>
               <a:rPr lang="en-DE" b="1"/>
-              <a:t>EXTERNAL DATA?!</a:t>
+              <a:t>EXTERNAL DATA</a:t>
             </a:r>
           </a:p>
           <a:p>
@@ -4300,26 +4130,14 @@
               <a:t>Household energy consumption</a:t>
             </a:r>
           </a:p>
-          <a:p>
-            <a:pPr marL="171450" indent="-171450">
-              <a:buFontTx/>
-              <a:buChar char="-"/>
-            </a:pPr>
-            <a:endParaRPr lang="en-US" sz="1100">
-              <a:solidFill>
-                <a:prstClr val="black"/>
-              </a:solidFill>
-              <a:latin typeface="Calibri" panose="020F0502020204030204"/>
-            </a:endParaRPr>
-          </a:p>
         </p:txBody>
       </p:sp>
       <p:cxnSp>
         <p:nvCxnSpPr>
-          <p:cNvPr id="29" name="Straight Arrow Connector 28">
+          <p:cNvPr id="30" name="Straight Arrow Connector 29">
             <a:extLst>
               <a:ext uri="{FF2B5EF4-FFF2-40B4-BE49-F238E27FC236}">
-                <a16:creationId xmlns:a16="http://schemas.microsoft.com/office/drawing/2014/main" id="{33FBB69D-F6F1-CCFD-48F1-D155EE0476A5}"/>
+                <a16:creationId xmlns:a16="http://schemas.microsoft.com/office/drawing/2014/main" id="{A2C4ED92-6F28-219C-2A33-35F618EC7D98}"/>
               </a:ext>
             </a:extLst>
           </p:cNvPr>
@@ -4330,8 +4148,8 @@
         </p:nvCxnSpPr>
         <p:spPr>
           <a:xfrm flipV="1">
-            <a:off x="3452585" y="4229631"/>
-            <a:ext cx="0" cy="1862253"/>
+            <a:off x="1675953" y="2780224"/>
+            <a:ext cx="0" cy="2442900"/>
           </a:xfrm>
           <a:prstGeom prst="straightConnector1">
             <a:avLst/>
@@ -4361,268 +4179,6 @@
       </p:cxnSp>
       <p:cxnSp>
         <p:nvCxnSpPr>
-          <p:cNvPr id="30" name="Straight Arrow Connector 29">
-            <a:extLst>
-              <a:ext uri="{FF2B5EF4-FFF2-40B4-BE49-F238E27FC236}">
-                <a16:creationId xmlns:a16="http://schemas.microsoft.com/office/drawing/2014/main" id="{A2C4ED92-6F28-219C-2A33-35F618EC7D98}"/>
-              </a:ext>
-            </a:extLst>
-          </p:cNvPr>
-          <p:cNvCxnSpPr>
-            <a:cxnSpLocks/>
-          </p:cNvCxnSpPr>
-          <p:nvPr/>
-        </p:nvCxnSpPr>
-        <p:spPr>
-          <a:xfrm flipV="1">
-            <a:off x="7834201" y="4237065"/>
-            <a:ext cx="0" cy="1862253"/>
-          </a:xfrm>
-          <a:prstGeom prst="straightConnector1">
-            <a:avLst/>
-          </a:prstGeom>
-          <a:ln w="25400">
-            <a:solidFill>
-              <a:schemeClr val="tx1"/>
-            </a:solidFill>
-            <a:headEnd type="triangle"/>
-            <a:tailEnd type="triangle"/>
-          </a:ln>
-        </p:spPr>
-        <p:style>
-          <a:lnRef idx="1">
-            <a:schemeClr val="accent1"/>
-          </a:lnRef>
-          <a:fillRef idx="0">
-            <a:schemeClr val="accent1"/>
-          </a:fillRef>
-          <a:effectRef idx="0">
-            <a:schemeClr val="accent1"/>
-          </a:effectRef>
-          <a:fontRef idx="minor">
-            <a:schemeClr val="tx1"/>
-          </a:fontRef>
-        </p:style>
-      </p:cxnSp>
-      <p:cxnSp>
-        <p:nvCxnSpPr>
-          <p:cNvPr id="31" name="Straight Arrow Connector 30">
-            <a:extLst>
-              <a:ext uri="{FF2B5EF4-FFF2-40B4-BE49-F238E27FC236}">
-                <a16:creationId xmlns:a16="http://schemas.microsoft.com/office/drawing/2014/main" id="{51758182-F05B-F953-43A1-104539176E54}"/>
-              </a:ext>
-            </a:extLst>
-          </p:cNvPr>
-          <p:cNvCxnSpPr>
-            <a:cxnSpLocks/>
-          </p:cNvCxnSpPr>
-          <p:nvPr/>
-        </p:nvCxnSpPr>
-        <p:spPr>
-          <a:xfrm flipV="1">
-            <a:off x="5667960" y="5281562"/>
-            <a:ext cx="0" cy="814039"/>
-          </a:xfrm>
-          <a:prstGeom prst="straightConnector1">
-            <a:avLst/>
-          </a:prstGeom>
-          <a:ln w="25400">
-            <a:solidFill>
-              <a:schemeClr val="tx1"/>
-            </a:solidFill>
-            <a:headEnd type="triangle"/>
-            <a:tailEnd type="triangle"/>
-          </a:ln>
-        </p:spPr>
-        <p:style>
-          <a:lnRef idx="1">
-            <a:schemeClr val="accent1"/>
-          </a:lnRef>
-          <a:fillRef idx="0">
-            <a:schemeClr val="accent1"/>
-          </a:fillRef>
-          <a:effectRef idx="0">
-            <a:schemeClr val="accent1"/>
-          </a:effectRef>
-          <a:fontRef idx="minor">
-            <a:schemeClr val="tx1"/>
-          </a:fontRef>
-        </p:style>
-      </p:cxnSp>
-      <p:sp>
-        <p:nvSpPr>
-          <p:cNvPr id="32" name="Freeform 31">
-            <a:extLst>
-              <a:ext uri="{FF2B5EF4-FFF2-40B4-BE49-F238E27FC236}">
-                <a16:creationId xmlns:a16="http://schemas.microsoft.com/office/drawing/2014/main" id="{4D026B66-39E8-D5D9-D4D6-780C2ED428A7}"/>
-              </a:ext>
-            </a:extLst>
-          </p:cNvPr>
-          <p:cNvSpPr/>
-          <p:nvPr/>
-        </p:nvSpPr>
-        <p:spPr>
-          <a:xfrm>
-            <a:off x="5548518" y="2527375"/>
-            <a:ext cx="4145280" cy="803464"/>
-          </a:xfrm>
-          <a:custGeom>
-            <a:avLst/>
-            <a:gdLst>
-              <a:gd name="connsiteX0" fmla="*/ 0 w 4145280"/>
-              <a:gd name="connsiteY0" fmla="*/ 803464 h 803464"/>
-              <a:gd name="connsiteX1" fmla="*/ 1584960 w 4145280"/>
-              <a:gd name="connsiteY1" fmla="*/ 824 h 803464"/>
-              <a:gd name="connsiteX2" fmla="*/ 4145280 w 4145280"/>
-              <a:gd name="connsiteY2" fmla="*/ 651064 h 803464"/>
-            </a:gdLst>
-            <a:ahLst/>
-            <a:cxnLst>
-              <a:cxn ang="0">
-                <a:pos x="connsiteX0" y="connsiteY0"/>
-              </a:cxn>
-              <a:cxn ang="0">
-                <a:pos x="connsiteX1" y="connsiteY1"/>
-              </a:cxn>
-              <a:cxn ang="0">
-                <a:pos x="connsiteX2" y="connsiteY2"/>
-              </a:cxn>
-            </a:cxnLst>
-            <a:rect l="l" t="t" r="r" b="b"/>
-            <a:pathLst>
-              <a:path w="4145280" h="803464">
-                <a:moveTo>
-                  <a:pt x="0" y="803464"/>
-                </a:moveTo>
-                <a:cubicBezTo>
-                  <a:pt x="447040" y="414844"/>
-                  <a:pt x="894080" y="26224"/>
-                  <a:pt x="1584960" y="824"/>
-                </a:cubicBezTo>
-                <a:cubicBezTo>
-                  <a:pt x="2275840" y="-24576"/>
-                  <a:pt x="3615267" y="544384"/>
-                  <a:pt x="4145280" y="651064"/>
-                </a:cubicBezTo>
-              </a:path>
-            </a:pathLst>
-          </a:custGeom>
-          <a:ln w="25400">
-            <a:headEnd type="triangle"/>
-            <a:tailEnd type="triangle"/>
-          </a:ln>
-        </p:spPr>
-        <p:style>
-          <a:lnRef idx="1">
-            <a:schemeClr val="dk1"/>
-          </a:lnRef>
-          <a:fillRef idx="0">
-            <a:schemeClr val="dk1"/>
-          </a:fillRef>
-          <a:effectRef idx="0">
-            <a:schemeClr val="dk1"/>
-          </a:effectRef>
-          <a:fontRef idx="minor">
-            <a:schemeClr val="tx1"/>
-          </a:fontRef>
-        </p:style>
-        <p:txBody>
-          <a:bodyPr rtlCol="0" anchor="ctr"/>
-          <a:lstStyle/>
-          <a:p>
-            <a:pPr algn="ctr"/>
-            <a:endParaRPr lang="en-DE"/>
-          </a:p>
-        </p:txBody>
-      </p:sp>
-      <p:sp>
-        <p:nvSpPr>
-          <p:cNvPr id="33" name="Freeform 32">
-            <a:extLst>
-              <a:ext uri="{FF2B5EF4-FFF2-40B4-BE49-F238E27FC236}">
-                <a16:creationId xmlns:a16="http://schemas.microsoft.com/office/drawing/2014/main" id="{7FC13612-8C1D-63B5-25CE-BE6A1507CE79}"/>
-              </a:ext>
-            </a:extLst>
-          </p:cNvPr>
-          <p:cNvSpPr/>
-          <p:nvPr/>
-        </p:nvSpPr>
-        <p:spPr>
-          <a:xfrm flipV="1">
-            <a:off x="5680284" y="5291719"/>
-            <a:ext cx="2845117" cy="314960"/>
-          </a:xfrm>
-          <a:custGeom>
-            <a:avLst/>
-            <a:gdLst>
-              <a:gd name="connsiteX0" fmla="*/ 0 w 4145280"/>
-              <a:gd name="connsiteY0" fmla="*/ 803464 h 803464"/>
-              <a:gd name="connsiteX1" fmla="*/ 1584960 w 4145280"/>
-              <a:gd name="connsiteY1" fmla="*/ 824 h 803464"/>
-              <a:gd name="connsiteX2" fmla="*/ 4145280 w 4145280"/>
-              <a:gd name="connsiteY2" fmla="*/ 651064 h 803464"/>
-            </a:gdLst>
-            <a:ahLst/>
-            <a:cxnLst>
-              <a:cxn ang="0">
-                <a:pos x="connsiteX0" y="connsiteY0"/>
-              </a:cxn>
-              <a:cxn ang="0">
-                <a:pos x="connsiteX1" y="connsiteY1"/>
-              </a:cxn>
-              <a:cxn ang="0">
-                <a:pos x="connsiteX2" y="connsiteY2"/>
-              </a:cxn>
-            </a:cxnLst>
-            <a:rect l="l" t="t" r="r" b="b"/>
-            <a:pathLst>
-              <a:path w="4145280" h="803464">
-                <a:moveTo>
-                  <a:pt x="0" y="803464"/>
-                </a:moveTo>
-                <a:cubicBezTo>
-                  <a:pt x="447040" y="414844"/>
-                  <a:pt x="894080" y="26224"/>
-                  <a:pt x="1584960" y="824"/>
-                </a:cubicBezTo>
-                <a:cubicBezTo>
-                  <a:pt x="2275840" y="-24576"/>
-                  <a:pt x="3615267" y="544384"/>
-                  <a:pt x="4145280" y="651064"/>
-                </a:cubicBezTo>
-              </a:path>
-            </a:pathLst>
-          </a:custGeom>
-          <a:ln w="25400">
-            <a:headEnd type="triangle"/>
-            <a:tailEnd type="triangle"/>
-          </a:ln>
-        </p:spPr>
-        <p:style>
-          <a:lnRef idx="1">
-            <a:schemeClr val="dk1"/>
-          </a:lnRef>
-          <a:fillRef idx="0">
-            <a:schemeClr val="dk1"/>
-          </a:fillRef>
-          <a:effectRef idx="0">
-            <a:schemeClr val="dk1"/>
-          </a:effectRef>
-          <a:fontRef idx="minor">
-            <a:schemeClr val="tx1"/>
-          </a:fontRef>
-        </p:style>
-        <p:txBody>
-          <a:bodyPr rtlCol="0" anchor="ctr"/>
-          <a:lstStyle/>
-          <a:p>
-            <a:pPr algn="ctr"/>
-            <a:endParaRPr lang="en-DE"/>
-          </a:p>
-        </p:txBody>
-      </p:sp>
-      <p:cxnSp>
-        <p:nvCxnSpPr>
           <p:cNvPr id="34" name="Straight Arrow Connector 33">
             <a:extLst>
               <a:ext uri="{FF2B5EF4-FFF2-40B4-BE49-F238E27FC236}">
@@ -4638,9 +4194,9 @@
           <p:nvPr/>
         </p:nvCxnSpPr>
         <p:spPr>
-          <a:xfrm flipH="1" flipV="1">
-            <a:off x="9630513" y="5791672"/>
-            <a:ext cx="2071768" cy="1579990"/>
+          <a:xfrm flipV="1">
+            <a:off x="8216105" y="5097730"/>
+            <a:ext cx="0" cy="580792"/>
           </a:xfrm>
           <a:prstGeom prst="straightConnector1">
             <a:avLst/>
@@ -4680,13 +4236,14 @@
           <p:cNvCxnSpPr>
             <a:cxnSpLocks/>
             <a:stCxn id="10" idx="0"/>
+            <a:endCxn id="21" idx="2"/>
           </p:cNvCxnSpPr>
           <p:nvPr/>
         </p:nvCxnSpPr>
         <p:spPr>
           <a:xfrm flipH="1" flipV="1">
-            <a:off x="11709685" y="7728740"/>
-            <a:ext cx="1905953" cy="996932"/>
+            <a:off x="8216105" y="6047731"/>
+            <a:ext cx="1421038" cy="1916957"/>
           </a:xfrm>
           <a:prstGeom prst="straightConnector1">
             <a:avLst/>
@@ -4726,13 +4283,14 @@
           <p:cNvCxnSpPr>
             <a:cxnSpLocks/>
             <a:stCxn id="5" idx="0"/>
+            <a:endCxn id="21" idx="2"/>
           </p:cNvCxnSpPr>
           <p:nvPr/>
         </p:nvCxnSpPr>
         <p:spPr>
           <a:xfrm flipV="1">
-            <a:off x="10793738" y="7749306"/>
-            <a:ext cx="959682" cy="996686"/>
+            <a:off x="6815249" y="6047731"/>
+            <a:ext cx="1400861" cy="1937277"/>
           </a:xfrm>
           <a:prstGeom prst="straightConnector1">
             <a:avLst/>
@@ -4774,8 +4332,8 @@
         </p:nvSpPr>
         <p:spPr>
           <a:xfrm>
-            <a:off x="18126840" y="13074966"/>
-            <a:ext cx="2352394" cy="646331"/>
+            <a:off x="14345570" y="12203320"/>
+            <a:ext cx="2352394" cy="646074"/>
           </a:xfrm>
           <a:prstGeom prst="rect">
             <a:avLst/>
@@ -4793,6 +4351,7 @@
           </a:bodyPr>
           <a:lstStyle/>
           <a:p>
+            <a:pPr algn="ctr"/>
             <a:r>
               <a:rPr lang="en-DE" b="1"/>
               <a:t>BUILD &amp; INTEGRATION TESTING</a:t>
@@ -4814,8 +4373,8 @@
         </p:nvSpPr>
         <p:spPr>
           <a:xfrm>
-            <a:off x="22119951" y="13185786"/>
-            <a:ext cx="1823102" cy="369332"/>
+            <a:off x="18141457" y="12323890"/>
+            <a:ext cx="1823102" cy="369204"/>
           </a:xfrm>
           <a:prstGeom prst="rect">
             <a:avLst/>
@@ -4833,6 +4392,7 @@
           </a:bodyPr>
           <a:lstStyle/>
           <a:p>
+            <a:pPr algn="ctr"/>
             <a:r>
               <a:rPr lang="en-DE" b="1"/>
               <a:t>DEPLOYMENT</a:t>
@@ -4854,8 +4414,8 @@
         </p:nvSpPr>
         <p:spPr>
           <a:xfrm>
-            <a:off x="20154700" y="3615186"/>
-            <a:ext cx="1823102" cy="811889"/>
+            <a:off x="15551786" y="2725610"/>
+            <a:ext cx="1823102" cy="646074"/>
           </a:xfrm>
           <a:prstGeom prst="rect">
             <a:avLst/>
@@ -4873,33 +4433,10 @@
           </a:bodyPr>
           <a:lstStyle/>
           <a:p>
+            <a:pPr algn="ctr"/>
             <a:r>
               <a:rPr lang="en-DE" b="1"/>
               <a:t>MONITORING &amp; LOGGING</a:t>
-            </a:r>
-          </a:p>
-          <a:p>
-            <a:pPr marL="171450" indent="-171450">
-              <a:buFontTx/>
-              <a:buChar char="-"/>
-            </a:pPr>
-            <a:r>
-              <a:rPr lang="en-US" sz="1100"/>
-              <a:t>D</a:t>
-            </a:r>
-            <a:r>
-              <a:rPr lang="en-DE" sz="1100"/>
-              <a:t>ssd</a:t>
-            </a:r>
-          </a:p>
-          <a:p>
-            <a:pPr marL="171450" indent="-171450">
-              <a:buFontTx/>
-              <a:buChar char="-"/>
-            </a:pPr>
-            <a:r>
-              <a:rPr lang="en-DE" sz="1100"/>
-              <a:t>ds</a:t>
             </a:r>
           </a:p>
         </p:txBody>
@@ -4918,8 +4455,8 @@
         </p:nvSpPr>
         <p:spPr>
           <a:xfrm>
-            <a:off x="14827826" y="13215642"/>
-            <a:ext cx="1823102" cy="369332"/>
+            <a:off x="10849332" y="12326066"/>
+            <a:ext cx="1823102" cy="369204"/>
           </a:xfrm>
           <a:prstGeom prst="rect">
             <a:avLst/>
@@ -4937,6 +4474,7 @@
           </a:bodyPr>
           <a:lstStyle/>
           <a:p>
+            <a:pPr algn="ctr"/>
             <a:r>
               <a:rPr lang="en-DE" b="1"/>
               <a:t>CODE</a:t>
@@ -4966,7 +4504,7 @@
         </p:blipFill>
         <p:spPr>
           <a:xfrm>
-            <a:off x="13246051" y="13209213"/>
+            <a:off x="16856181" y="11494890"/>
             <a:ext cx="1206866" cy="755317"/>
           </a:xfrm>
           <a:prstGeom prst="rect">
@@ -4990,8 +4528,8 @@
         </p:nvCxnSpPr>
         <p:spPr>
           <a:xfrm flipV="1">
-            <a:off x="18818469" y="11793383"/>
-            <a:ext cx="0" cy="1270219"/>
+            <a:off x="15037199" y="10710753"/>
+            <a:ext cx="0" cy="1481202"/>
           </a:xfrm>
           <a:prstGeom prst="straightConnector1">
             <a:avLst/>
@@ -5035,8 +4573,8 @@
         </p:nvCxnSpPr>
         <p:spPr>
           <a:xfrm flipV="1">
-            <a:off x="19630626" y="11795312"/>
-            <a:ext cx="0" cy="1270219"/>
+            <a:off x="15849356" y="10692829"/>
+            <a:ext cx="0" cy="1501061"/>
           </a:xfrm>
           <a:prstGeom prst="straightConnector1">
             <a:avLst/>
@@ -5081,9 +4619,9 @@
           <p:nvPr/>
         </p:nvCxnSpPr>
         <p:spPr>
-          <a:xfrm flipH="1">
-            <a:off x="16650928" y="13398132"/>
-            <a:ext cx="1475912" cy="2176"/>
+          <a:xfrm flipH="1" flipV="1">
+            <a:off x="12672434" y="12510673"/>
+            <a:ext cx="1673136" cy="15689"/>
           </a:xfrm>
           <a:prstGeom prst="straightConnector1">
             <a:avLst/>
@@ -5123,13 +4661,14 @@
           <p:cNvCxnSpPr>
             <a:cxnSpLocks/>
             <a:stCxn id="44" idx="1"/>
+            <a:endCxn id="43" idx="3"/>
           </p:cNvCxnSpPr>
           <p:nvPr/>
         </p:nvCxnSpPr>
         <p:spPr>
           <a:xfrm flipH="1">
-            <a:off x="20496647" y="13370452"/>
-            <a:ext cx="1623304" cy="180082"/>
+            <a:off x="16697969" y="12508497"/>
+            <a:ext cx="1443493" cy="17865"/>
           </a:xfrm>
           <a:prstGeom prst="straightConnector1">
             <a:avLst/>
@@ -5175,7 +4714,7 @@
         </p:nvSpPr>
         <p:spPr>
           <a:xfrm>
-            <a:off x="5993408" y="754586"/>
+            <a:off x="4193185" y="214836"/>
             <a:ext cx="13500497" cy="951548"/>
           </a:xfrm>
         </p:spPr>
@@ -5187,7 +4726,7 @@
           <a:p>
             <a:r>
               <a:rPr lang="en-DE" sz="4000" u="sng"/>
-              <a:t>ML ENGINEERING WORKFLOW</a:t>
+              <a:t>ML Engineering Workflow</a:t>
             </a:r>
           </a:p>
         </p:txBody>
@@ -5206,8 +4745,8 @@
         </p:nvSpPr>
         <p:spPr>
           <a:xfrm rot="4726331">
-            <a:off x="18206706" y="8129043"/>
-            <a:ext cx="8773727" cy="1351326"/>
+            <a:off x="13885253" y="7112959"/>
+            <a:ext cx="9135263" cy="1351326"/>
           </a:xfrm>
           <a:custGeom>
             <a:avLst/>
@@ -5296,8 +4835,8 @@
         </p:nvCxnSpPr>
         <p:spPr>
           <a:xfrm flipV="1">
-            <a:off x="10713698" y="4021130"/>
-            <a:ext cx="9441002" cy="1205932"/>
+            <a:off x="9462458" y="3048652"/>
+            <a:ext cx="6089328" cy="1525863"/>
           </a:xfrm>
           <a:prstGeom prst="straightConnector1">
             <a:avLst/>
@@ -5325,12 +4864,433 @@
           </a:fontRef>
         </p:style>
       </p:cxnSp>
-      <p:sp>
-        <p:nvSpPr>
-          <p:cNvPr id="69" name="TextBox 68">
+      <p:cxnSp>
+        <p:nvCxnSpPr>
+          <p:cNvPr id="72" name="Straight Arrow Connector 71">
             <a:extLst>
               <a:ext uri="{FF2B5EF4-FFF2-40B4-BE49-F238E27FC236}">
-                <a16:creationId xmlns:a16="http://schemas.microsoft.com/office/drawing/2014/main" id="{39074CC2-89ED-9D1E-5B7F-E475E4D395B8}"/>
+                <a16:creationId xmlns:a16="http://schemas.microsoft.com/office/drawing/2014/main" id="{A4E561B8-B9E8-4442-00B1-DE042DF94788}"/>
+              </a:ext>
+            </a:extLst>
+          </p:cNvPr>
+          <p:cNvCxnSpPr>
+            <a:cxnSpLocks/>
+            <a:endCxn id="28" idx="2"/>
+          </p:cNvCxnSpPr>
+          <p:nvPr/>
+        </p:nvCxnSpPr>
+        <p:spPr>
+          <a:xfrm flipV="1">
+            <a:off x="4008106" y="4175230"/>
+            <a:ext cx="0" cy="1057703"/>
+          </a:xfrm>
+          <a:prstGeom prst="straightConnector1">
+            <a:avLst/>
+          </a:prstGeom>
+          <a:ln w="25400">
+            <a:solidFill>
+              <a:schemeClr val="tx1"/>
+            </a:solidFill>
+            <a:headEnd type="triangle"/>
+            <a:tailEnd type="triangle"/>
+          </a:ln>
+        </p:spPr>
+        <p:style>
+          <a:lnRef idx="1">
+            <a:schemeClr val="accent1"/>
+          </a:lnRef>
+          <a:fillRef idx="0">
+            <a:schemeClr val="accent1"/>
+          </a:fillRef>
+          <a:effectRef idx="0">
+            <a:schemeClr val="accent1"/>
+          </a:effectRef>
+          <a:fontRef idx="minor">
+            <a:schemeClr val="tx1"/>
+          </a:fontRef>
+        </p:style>
+      </p:cxnSp>
+      <p:cxnSp>
+        <p:nvCxnSpPr>
+          <p:cNvPr id="76" name="Straight Arrow Connector 75">
+            <a:extLst>
+              <a:ext uri="{FF2B5EF4-FFF2-40B4-BE49-F238E27FC236}">
+                <a16:creationId xmlns:a16="http://schemas.microsoft.com/office/drawing/2014/main" id="{8F2191D3-48A4-EA81-229A-BCB376A06D86}"/>
+              </a:ext>
+            </a:extLst>
+          </p:cNvPr>
+          <p:cNvCxnSpPr>
+            <a:cxnSpLocks/>
+          </p:cNvCxnSpPr>
+          <p:nvPr/>
+        </p:nvCxnSpPr>
+        <p:spPr>
+          <a:xfrm flipV="1">
+            <a:off x="2607871" y="3536655"/>
+            <a:ext cx="0" cy="1673949"/>
+          </a:xfrm>
+          <a:prstGeom prst="straightConnector1">
+            <a:avLst/>
+          </a:prstGeom>
+          <a:ln w="25400">
+            <a:solidFill>
+              <a:schemeClr val="tx1"/>
+            </a:solidFill>
+            <a:headEnd type="triangle"/>
+            <a:tailEnd type="triangle"/>
+          </a:ln>
+        </p:spPr>
+        <p:style>
+          <a:lnRef idx="1">
+            <a:schemeClr val="accent1"/>
+          </a:lnRef>
+          <a:fillRef idx="0">
+            <a:schemeClr val="accent1"/>
+          </a:fillRef>
+          <a:effectRef idx="0">
+            <a:schemeClr val="accent1"/>
+          </a:effectRef>
+          <a:fontRef idx="minor">
+            <a:schemeClr val="tx1"/>
+          </a:fontRef>
+        </p:style>
+      </p:cxnSp>
+      <p:cxnSp>
+        <p:nvCxnSpPr>
+          <p:cNvPr id="88" name="Straight Arrow Connector 87">
+            <a:extLst>
+              <a:ext uri="{FF2B5EF4-FFF2-40B4-BE49-F238E27FC236}">
+                <a16:creationId xmlns:a16="http://schemas.microsoft.com/office/drawing/2014/main" id="{E1E085DB-A043-A084-D6AD-82058481C11A}"/>
+              </a:ext>
+            </a:extLst>
+          </p:cNvPr>
+          <p:cNvCxnSpPr>
+            <a:cxnSpLocks/>
+            <a:stCxn id="25" idx="2"/>
+            <a:endCxn id="27" idx="0"/>
+          </p:cNvCxnSpPr>
+          <p:nvPr/>
+        </p:nvCxnSpPr>
+        <p:spPr>
+          <a:xfrm>
+            <a:off x="8216105" y="3416150"/>
+            <a:ext cx="0" cy="635140"/>
+          </a:xfrm>
+          <a:prstGeom prst="straightConnector1">
+            <a:avLst/>
+          </a:prstGeom>
+          <a:ln w="25400">
+            <a:solidFill>
+              <a:schemeClr val="tx1"/>
+            </a:solidFill>
+            <a:headEnd type="triangle"/>
+            <a:tailEnd type="triangle"/>
+          </a:ln>
+        </p:spPr>
+        <p:style>
+          <a:lnRef idx="1">
+            <a:schemeClr val="accent1"/>
+          </a:lnRef>
+          <a:fillRef idx="0">
+            <a:schemeClr val="accent1"/>
+          </a:fillRef>
+          <a:effectRef idx="0">
+            <a:schemeClr val="accent1"/>
+          </a:effectRef>
+          <a:fontRef idx="minor">
+            <a:schemeClr val="tx1"/>
+          </a:fontRef>
+        </p:style>
+      </p:cxnSp>
+      <p:sp>
+        <p:nvSpPr>
+          <p:cNvPr id="99" name="Striped Right Arrow 98">
+            <a:extLst>
+              <a:ext uri="{FF2B5EF4-FFF2-40B4-BE49-F238E27FC236}">
+                <a16:creationId xmlns:a16="http://schemas.microsoft.com/office/drawing/2014/main" id="{F2ECEFD0-7391-B773-CE01-FD5670023A3B}"/>
+              </a:ext>
+            </a:extLst>
+          </p:cNvPr>
+          <p:cNvSpPr/>
+          <p:nvPr/>
+        </p:nvSpPr>
+        <p:spPr>
+          <a:xfrm>
+            <a:off x="5157157" y="2673937"/>
+            <a:ext cx="1934818" cy="252143"/>
+          </a:xfrm>
+          <a:prstGeom prst="stripedRightArrow">
+            <a:avLst>
+              <a:gd name="adj1" fmla="val 50000"/>
+              <a:gd name="adj2" fmla="val 58696"/>
+            </a:avLst>
+          </a:prstGeom>
+          <a:solidFill>
+            <a:schemeClr val="bg1">
+              <a:lumMod val="50000"/>
+            </a:schemeClr>
+          </a:solidFill>
+          <a:ln>
+            <a:noFill/>
+          </a:ln>
+        </p:spPr>
+        <p:style>
+          <a:lnRef idx="2">
+            <a:schemeClr val="accent1">
+              <a:shade val="50000"/>
+            </a:schemeClr>
+          </a:lnRef>
+          <a:fillRef idx="1">
+            <a:schemeClr val="accent1"/>
+          </a:fillRef>
+          <a:effectRef idx="0">
+            <a:schemeClr val="accent1"/>
+          </a:effectRef>
+          <a:fontRef idx="minor">
+            <a:schemeClr val="lt1"/>
+          </a:fontRef>
+        </p:style>
+        <p:txBody>
+          <a:bodyPr rtlCol="0" anchor="ctr"/>
+          <a:lstStyle/>
+          <a:p>
+            <a:pPr algn="ctr"/>
+            <a:endParaRPr lang="en-DE"/>
+          </a:p>
+        </p:txBody>
+      </p:sp>
+      <p:cxnSp>
+        <p:nvCxnSpPr>
+          <p:cNvPr id="128" name="Straight Arrow Connector 127">
+            <a:extLst>
+              <a:ext uri="{FF2B5EF4-FFF2-40B4-BE49-F238E27FC236}">
+                <a16:creationId xmlns:a16="http://schemas.microsoft.com/office/drawing/2014/main" id="{A99BED45-86D1-7DB5-FB03-F22DFA2CCA07}"/>
+              </a:ext>
+            </a:extLst>
+          </p:cNvPr>
+          <p:cNvCxnSpPr>
+            <a:cxnSpLocks/>
+            <a:stCxn id="8" idx="0"/>
+          </p:cNvCxnSpPr>
+          <p:nvPr/>
+        </p:nvCxnSpPr>
+        <p:spPr>
+          <a:xfrm flipV="1">
+            <a:off x="6794259" y="8544709"/>
+            <a:ext cx="0" cy="1747800"/>
+          </a:xfrm>
+          <a:prstGeom prst="straightConnector1">
+            <a:avLst/>
+          </a:prstGeom>
+          <a:ln w="25400">
+            <a:solidFill>
+              <a:schemeClr val="tx1"/>
+            </a:solidFill>
+            <a:headEnd type="triangle"/>
+            <a:tailEnd type="none"/>
+          </a:ln>
+        </p:spPr>
+        <p:style>
+          <a:lnRef idx="1">
+            <a:schemeClr val="accent1"/>
+          </a:lnRef>
+          <a:fillRef idx="0">
+            <a:schemeClr val="accent1"/>
+          </a:fillRef>
+          <a:effectRef idx="0">
+            <a:schemeClr val="accent1"/>
+          </a:effectRef>
+          <a:fontRef idx="minor">
+            <a:schemeClr val="tx1"/>
+          </a:fontRef>
+        </p:style>
+      </p:cxnSp>
+      <p:cxnSp>
+        <p:nvCxnSpPr>
+          <p:cNvPr id="133" name="Straight Arrow Connector 132">
+            <a:extLst>
+              <a:ext uri="{FF2B5EF4-FFF2-40B4-BE49-F238E27FC236}">
+                <a16:creationId xmlns:a16="http://schemas.microsoft.com/office/drawing/2014/main" id="{E3649203-90F0-E0E2-F9D1-7B8866EF00CD}"/>
+              </a:ext>
+            </a:extLst>
+          </p:cNvPr>
+          <p:cNvCxnSpPr>
+            <a:cxnSpLocks/>
+          </p:cNvCxnSpPr>
+          <p:nvPr/>
+        </p:nvCxnSpPr>
+        <p:spPr>
+          <a:xfrm flipV="1">
+            <a:off x="9631802" y="8508428"/>
+            <a:ext cx="0" cy="1763487"/>
+          </a:xfrm>
+          <a:prstGeom prst="straightConnector1">
+            <a:avLst/>
+          </a:prstGeom>
+          <a:ln w="25400">
+            <a:solidFill>
+              <a:schemeClr val="tx1"/>
+            </a:solidFill>
+            <a:headEnd type="triangle"/>
+            <a:tailEnd type="none"/>
+          </a:ln>
+        </p:spPr>
+        <p:style>
+          <a:lnRef idx="1">
+            <a:schemeClr val="accent1"/>
+          </a:lnRef>
+          <a:fillRef idx="0">
+            <a:schemeClr val="accent1"/>
+          </a:fillRef>
+          <a:effectRef idx="0">
+            <a:schemeClr val="accent1"/>
+          </a:effectRef>
+          <a:fontRef idx="minor">
+            <a:schemeClr val="tx1"/>
+          </a:fontRef>
+        </p:style>
+      </p:cxnSp>
+      <p:cxnSp>
+        <p:nvCxnSpPr>
+          <p:cNvPr id="136" name="Straight Arrow Connector 135">
+            <a:extLst>
+              <a:ext uri="{FF2B5EF4-FFF2-40B4-BE49-F238E27FC236}">
+                <a16:creationId xmlns:a16="http://schemas.microsoft.com/office/drawing/2014/main" id="{E7EEDCF7-9D07-4E33-5196-8D033F21F902}"/>
+              </a:ext>
+            </a:extLst>
+          </p:cNvPr>
+          <p:cNvCxnSpPr>
+            <a:cxnSpLocks/>
+          </p:cNvCxnSpPr>
+          <p:nvPr/>
+        </p:nvCxnSpPr>
+        <p:spPr>
+          <a:xfrm flipH="1">
+            <a:off x="8020161" y="10604491"/>
+            <a:ext cx="603374" cy="0"/>
+          </a:xfrm>
+          <a:prstGeom prst="straightConnector1">
+            <a:avLst/>
+          </a:prstGeom>
+          <a:ln w="25400">
+            <a:solidFill>
+              <a:schemeClr val="tx1"/>
+            </a:solidFill>
+            <a:headEnd type="triangle"/>
+            <a:tailEnd type="triangle"/>
+          </a:ln>
+        </p:spPr>
+        <p:style>
+          <a:lnRef idx="1">
+            <a:schemeClr val="accent1"/>
+          </a:lnRef>
+          <a:fillRef idx="0">
+            <a:schemeClr val="accent1"/>
+          </a:fillRef>
+          <a:effectRef idx="0">
+            <a:schemeClr val="accent1"/>
+          </a:effectRef>
+          <a:fontRef idx="minor">
+            <a:schemeClr val="tx1"/>
+          </a:fontRef>
+        </p:style>
+      </p:cxnSp>
+      <p:cxnSp>
+        <p:nvCxnSpPr>
+          <p:cNvPr id="140" name="Straight Arrow Connector 139">
+            <a:extLst>
+              <a:ext uri="{FF2B5EF4-FFF2-40B4-BE49-F238E27FC236}">
+                <a16:creationId xmlns:a16="http://schemas.microsoft.com/office/drawing/2014/main" id="{F89E7F29-0C2F-92A7-5B7C-CDBC7E9EF159}"/>
+              </a:ext>
+            </a:extLst>
+          </p:cNvPr>
+          <p:cNvCxnSpPr>
+            <a:cxnSpLocks/>
+          </p:cNvCxnSpPr>
+          <p:nvPr/>
+        </p:nvCxnSpPr>
+        <p:spPr>
+          <a:xfrm flipH="1">
+            <a:off x="10931312" y="10533550"/>
+            <a:ext cx="601313" cy="0"/>
+          </a:xfrm>
+          <a:prstGeom prst="straightConnector1">
+            <a:avLst/>
+          </a:prstGeom>
+          <a:ln w="25400">
+            <a:solidFill>
+              <a:schemeClr val="tx1"/>
+            </a:solidFill>
+            <a:headEnd type="triangle"/>
+            <a:tailEnd type="none"/>
+          </a:ln>
+        </p:spPr>
+        <p:style>
+          <a:lnRef idx="1">
+            <a:schemeClr val="accent1"/>
+          </a:lnRef>
+          <a:fillRef idx="0">
+            <a:schemeClr val="accent1"/>
+          </a:fillRef>
+          <a:effectRef idx="0">
+            <a:schemeClr val="accent1"/>
+          </a:effectRef>
+          <a:fontRef idx="minor">
+            <a:schemeClr val="tx1"/>
+          </a:fontRef>
+        </p:style>
+      </p:cxnSp>
+      <p:cxnSp>
+        <p:nvCxnSpPr>
+          <p:cNvPr id="142" name="Straight Arrow Connector 141">
+            <a:extLst>
+              <a:ext uri="{FF2B5EF4-FFF2-40B4-BE49-F238E27FC236}">
+                <a16:creationId xmlns:a16="http://schemas.microsoft.com/office/drawing/2014/main" id="{54CB957B-D4F9-0B2C-F9F2-E92245D50F22}"/>
+              </a:ext>
+            </a:extLst>
+          </p:cNvPr>
+          <p:cNvCxnSpPr>
+            <a:cxnSpLocks/>
+          </p:cNvCxnSpPr>
+          <p:nvPr/>
+        </p:nvCxnSpPr>
+        <p:spPr>
+          <a:xfrm flipH="1">
+            <a:off x="13884963" y="10497264"/>
+            <a:ext cx="732972" cy="0"/>
+          </a:xfrm>
+          <a:prstGeom prst="straightConnector1">
+            <a:avLst/>
+          </a:prstGeom>
+          <a:ln w="25400">
+            <a:solidFill>
+              <a:schemeClr val="tx1"/>
+            </a:solidFill>
+            <a:headEnd type="triangle"/>
+            <a:tailEnd type="none"/>
+          </a:ln>
+        </p:spPr>
+        <p:style>
+          <a:lnRef idx="1">
+            <a:schemeClr val="accent1"/>
+          </a:lnRef>
+          <a:fillRef idx="0">
+            <a:schemeClr val="accent1"/>
+          </a:fillRef>
+          <a:effectRef idx="0">
+            <a:schemeClr val="accent1"/>
+          </a:effectRef>
+          <a:fontRef idx="minor">
+            <a:schemeClr val="tx1"/>
+          </a:fontRef>
+        </p:style>
+      </p:cxnSp>
+      <p:sp>
+        <p:nvSpPr>
+          <p:cNvPr id="151" name="TextBox 150">
+            <a:extLst>
+              <a:ext uri="{FF2B5EF4-FFF2-40B4-BE49-F238E27FC236}">
+                <a16:creationId xmlns:a16="http://schemas.microsoft.com/office/drawing/2014/main" id="{4348D361-37BD-0545-5606-245EDD2A0CB2}"/>
               </a:ext>
             </a:extLst>
           </p:cNvPr>
@@ -5338,33 +5298,196 @@
           <p:nvPr/>
         </p:nvSpPr>
         <p:spPr>
-          <a:xfrm>
-            <a:off x="6302829" y="7012968"/>
-            <a:ext cx="12605656" cy="369332"/>
+          <a:xfrm rot="20768302">
+            <a:off x="11679490" y="3226503"/>
+            <a:ext cx="2634503" cy="461665"/>
           </a:xfrm>
           <a:prstGeom prst="rect">
             <a:avLst/>
           </a:prstGeom>
           <a:noFill/>
-        </p:spPr>
-        <p:txBody>
-          <a:bodyPr wrap="square">
+          <a:ln w="25400">
+            <a:noFill/>
+          </a:ln>
+        </p:spPr>
+        <p:txBody>
+          <a:bodyPr wrap="square" rtlCol="0">
             <a:spAutoFit/>
           </a:bodyPr>
           <a:lstStyle/>
           <a:p>
-            <a:r>
-              <a:rPr lang="en-DE" sz="1800"/>
-              <a:t>ds</a:t>
-            </a:r>
-            <a:endParaRPr lang="en-DE"/>
+            <a:pPr algn="ctr"/>
+            <a:r>
+              <a:rPr lang="en-DE" sz="1200"/>
+              <a:t>FEEDBACK</a:t>
+            </a:r>
+          </a:p>
+          <a:p>
+            <a:pPr algn="ctr"/>
+            <a:r>
+              <a:rPr lang="en-US" sz="1200"/>
+              <a:t>N</a:t>
+            </a:r>
+            <a:r>
+              <a:rPr lang="en-DE" sz="1200"/>
+              <a:t>ew data from model performance</a:t>
+            </a:r>
+          </a:p>
+        </p:txBody>
+      </p:sp>
+      <p:sp>
+        <p:nvSpPr>
+          <p:cNvPr id="152" name="TextBox 151">
+            <a:extLst>
+              <a:ext uri="{FF2B5EF4-FFF2-40B4-BE49-F238E27FC236}">
+                <a16:creationId xmlns:a16="http://schemas.microsoft.com/office/drawing/2014/main" id="{EE370718-1343-C391-5CFE-20FE014D83AF}"/>
+              </a:ext>
+            </a:extLst>
+          </p:cNvPr>
+          <p:cNvSpPr txBox="1"/>
+          <p:nvPr/>
+        </p:nvSpPr>
+        <p:spPr>
+          <a:xfrm>
+            <a:off x="16616892" y="4018732"/>
+            <a:ext cx="870607" cy="646331"/>
+          </a:xfrm>
+          <a:prstGeom prst="rect">
+            <a:avLst/>
+          </a:prstGeom>
+          <a:noFill/>
+          <a:ln w="25400">
+            <a:noFill/>
+          </a:ln>
+        </p:spPr>
+        <p:txBody>
+          <a:bodyPr wrap="square" rtlCol="0">
+            <a:spAutoFit/>
+          </a:bodyPr>
+          <a:lstStyle/>
+          <a:p>
+            <a:pPr algn="ctr"/>
+            <a:r>
+              <a:rPr lang="de-DE" sz="1200"/>
+              <a:t>Model </a:t>
+            </a:r>
+          </a:p>
+          <a:p>
+            <a:pPr algn="ctr"/>
+            <a:r>
+              <a:rPr lang="de-DE" sz="1200"/>
+              <a:t>Decay </a:t>
+            </a:r>
+          </a:p>
+          <a:p>
+            <a:pPr algn="ctr"/>
+            <a:r>
+              <a:rPr lang="de-DE" sz="1200"/>
+              <a:t>Trigger</a:t>
+            </a:r>
+            <a:endParaRPr lang="en-DE" sz="1200"/>
+          </a:p>
+        </p:txBody>
+      </p:sp>
+      <p:sp>
+        <p:nvSpPr>
+          <p:cNvPr id="153" name="TextBox 152">
+            <a:extLst>
+              <a:ext uri="{FF2B5EF4-FFF2-40B4-BE49-F238E27FC236}">
+                <a16:creationId xmlns:a16="http://schemas.microsoft.com/office/drawing/2014/main" id="{399888EC-E885-5176-7AF1-ED991AABE2F5}"/>
+              </a:ext>
+            </a:extLst>
+          </p:cNvPr>
+          <p:cNvSpPr txBox="1"/>
+          <p:nvPr/>
+        </p:nvSpPr>
+        <p:spPr>
+          <a:xfrm>
+            <a:off x="18720231" y="347434"/>
+            <a:ext cx="1798906" cy="1692771"/>
+          </a:xfrm>
+          <a:prstGeom prst="rect">
+            <a:avLst/>
+          </a:prstGeom>
+          <a:noFill/>
+          <a:ln w="25400">
+            <a:solidFill>
+              <a:schemeClr val="tx1"/>
+            </a:solidFill>
+          </a:ln>
+        </p:spPr>
+        <p:txBody>
+          <a:bodyPr wrap="square" rtlCol="0">
+            <a:spAutoFit/>
+          </a:bodyPr>
+          <a:lstStyle/>
+          <a:p>
+            <a:r>
+              <a:rPr lang="en-DE" sz="2400" b="1"/>
+              <a:t>Team: E.ON</a:t>
+            </a:r>
+          </a:p>
+          <a:p>
+            <a:r>
+              <a:rPr lang="en-DE" sz="1600">
+                <a:solidFill>
+                  <a:prstClr val="black"/>
+                </a:solidFill>
+                <a:latin typeface="Calibri" panose="020F0502020204030204"/>
+              </a:rPr>
+              <a:t>Chaitanya Shinde</a:t>
+            </a:r>
+          </a:p>
+          <a:p>
+            <a:r>
+              <a:rPr lang="en-DE" sz="1600">
+                <a:solidFill>
+                  <a:prstClr val="black"/>
+                </a:solidFill>
+                <a:latin typeface="Calibri" panose="020F0502020204030204"/>
+              </a:rPr>
+              <a:t>Richard Jasansky</a:t>
+            </a:r>
+          </a:p>
+          <a:p>
+            <a:r>
+              <a:rPr lang="en-DE" sz="1600">
+                <a:solidFill>
+                  <a:prstClr val="black"/>
+                </a:solidFill>
+                <a:latin typeface="Calibri" panose="020F0502020204030204"/>
+              </a:rPr>
+              <a:t>Dominik Schäfer</a:t>
+            </a:r>
+          </a:p>
+          <a:p>
+            <a:r>
+              <a:rPr lang="en-DE" sz="1600">
+                <a:solidFill>
+                  <a:prstClr val="black"/>
+                </a:solidFill>
+                <a:latin typeface="Calibri" panose="020F0502020204030204"/>
+              </a:rPr>
+              <a:t>Michael Fuest</a:t>
+            </a:r>
+          </a:p>
+          <a:p>
+            <a:r>
+              <a:rPr lang="en-DE" sz="1600">
+                <a:solidFill>
+                  <a:prstClr val="black"/>
+                </a:solidFill>
+                <a:latin typeface="Calibri" panose="020F0502020204030204"/>
+              </a:rPr>
+              <a:t>Nick Knappstein</a:t>
+            </a:r>
           </a:p>
         </p:txBody>
       </p:sp>
     </p:spTree>
     <p:extLst>
       <p:ext uri="{BB962C8B-B14F-4D97-AF65-F5344CB8AC3E}">
-        <p14:creationId xmlns:p14="http://schemas.microsoft.com/office/powerpoint/2010/main" val="2650226265"/>
+        <p14:creationId xmlns:p14="http://schemas.microsoft.com/office/powerpoint/2010/main" val="1256421725"/>
       </p:ext>
     </p:extLst>
   </p:cSld>

</xml_diff>